<commit_message>
Actualizacion de documentacion e inclusion del script vacio en una página web
</commit_message>
<xml_diff>
--- a/TallerProcessing/Introducción mínima a Processing.pptx
+++ b/TallerProcessing/Introducción mínima a Processing.pptx
@@ -5,21 +5,26 @@
     <p:sldMasterId id="2147483660" r:id="rId1"/>
   </p:sldMasterIdLst>
   <p:notesMasterIdLst>
-    <p:notesMasterId r:id="rId14"/>
+    <p:notesMasterId r:id="rId19"/>
   </p:notesMasterIdLst>
   <p:sldIdLst>
     <p:sldId id="256" r:id="rId2"/>
     <p:sldId id="257" r:id="rId3"/>
-    <p:sldId id="269" r:id="rId4"/>
-    <p:sldId id="273" r:id="rId5"/>
-    <p:sldId id="272" r:id="rId6"/>
-    <p:sldId id="261" r:id="rId7"/>
-    <p:sldId id="274" r:id="rId8"/>
-    <p:sldId id="262" r:id="rId9"/>
-    <p:sldId id="275" r:id="rId10"/>
+    <p:sldId id="276" r:id="rId4"/>
+    <p:sldId id="277" r:id="rId5"/>
+    <p:sldId id="278" r:id="rId6"/>
+    <p:sldId id="279" r:id="rId7"/>
+    <p:sldId id="263" r:id="rId8"/>
+    <p:sldId id="272" r:id="rId9"/>
+    <p:sldId id="280" r:id="rId10"/>
     <p:sldId id="271" r:id="rId11"/>
-    <p:sldId id="263" r:id="rId12"/>
-    <p:sldId id="258" r:id="rId13"/>
+    <p:sldId id="275" r:id="rId12"/>
+    <p:sldId id="273" r:id="rId13"/>
+    <p:sldId id="258" r:id="rId14"/>
+    <p:sldId id="261" r:id="rId15"/>
+    <p:sldId id="274" r:id="rId16"/>
+    <p:sldId id="262" r:id="rId17"/>
+    <p:sldId id="269" r:id="rId18"/>
   </p:sldIdLst>
   <p:sldSz cx="9144000" cy="6858000" type="screen4x3"/>
   <p:notesSz cx="6858000" cy="9144000"/>
@@ -208,7 +213,7 @@
           <a:p>
             <a:fld id="{48813590-ED14-429A-B911-15306AE9A8A3}" type="datetimeFigureOut">
               <a:rPr lang="es-ES" smtClean="0"/>
-              <a:t>15/12/2014</a:t>
+              <a:t>31/03/2017</a:t>
             </a:fld>
             <a:endParaRPr lang="es-ES"/>
           </a:p>
@@ -476,6 +481,258 @@
 </p:notesMaster>
 </file>
 
+<file path=ppt/notesSlides/notesSlide1.xml><?xml version="1.0" encoding="utf-8"?>
+<p:notes xmlns:a="http://schemas.openxmlformats.org/drawingml/2006/main" xmlns:r="http://schemas.openxmlformats.org/officeDocument/2006/relationships" xmlns:p="http://schemas.openxmlformats.org/presentationml/2006/main">
+  <p:cSld>
+    <p:spTree>
+      <p:nvGrpSpPr>
+        <p:cNvPr id="1" name=""/>
+        <p:cNvGrpSpPr/>
+        <p:nvPr/>
+      </p:nvGrpSpPr>
+      <p:grpSpPr>
+        <a:xfrm>
+          <a:off x="0" y="0"/>
+          <a:ext cx="0" cy="0"/>
+          <a:chOff x="0" y="0"/>
+          <a:chExt cx="0" cy="0"/>
+        </a:xfrm>
+      </p:grpSpPr>
+      <p:sp>
+        <p:nvSpPr>
+          <p:cNvPr id="2" name="Marcador de imagen de diapositiva 1"/>
+          <p:cNvSpPr>
+            <a:spLocks noGrp="1" noRot="1" noChangeAspect="1"/>
+          </p:cNvSpPr>
+          <p:nvPr>
+            <p:ph type="sldImg"/>
+          </p:nvPr>
+        </p:nvSpPr>
+        <p:spPr/>
+      </p:sp>
+      <p:sp>
+        <p:nvSpPr>
+          <p:cNvPr id="3" name="Marcador de notas 2"/>
+          <p:cNvSpPr>
+            <a:spLocks noGrp="1"/>
+          </p:cNvSpPr>
+          <p:nvPr>
+            <p:ph type="body" idx="1"/>
+          </p:nvPr>
+        </p:nvSpPr>
+        <p:spPr/>
+        <p:txBody>
+          <a:bodyPr/>
+          <a:lstStyle/>
+          <a:p>
+            <a:endParaRPr lang="es-ES" dirty="0"/>
+          </a:p>
+        </p:txBody>
+      </p:sp>
+      <p:sp>
+        <p:nvSpPr>
+          <p:cNvPr id="4" name="Marcador de número de diapositiva 3"/>
+          <p:cNvSpPr>
+            <a:spLocks noGrp="1"/>
+          </p:cNvSpPr>
+          <p:nvPr>
+            <p:ph type="sldNum" sz="quarter" idx="10"/>
+          </p:nvPr>
+        </p:nvSpPr>
+        <p:spPr/>
+        <p:txBody>
+          <a:bodyPr/>
+          <a:lstStyle/>
+          <a:p>
+            <a:fld id="{BF40B89A-BFCF-4B1B-94EA-9BC65E5FCF75}" type="slidenum">
+              <a:rPr lang="es-ES" smtClean="0"/>
+              <a:t>7</a:t>
+            </a:fld>
+            <a:endParaRPr lang="es-ES"/>
+          </a:p>
+        </p:txBody>
+      </p:sp>
+    </p:spTree>
+    <p:extLst>
+      <p:ext uri="{BB962C8B-B14F-4D97-AF65-F5344CB8AC3E}">
+        <p14:creationId xmlns:p14="http://schemas.microsoft.com/office/powerpoint/2010/main" val="1305049679"/>
+      </p:ext>
+    </p:extLst>
+  </p:cSld>
+  <p:clrMapOvr>
+    <a:masterClrMapping/>
+  </p:clrMapOvr>
+</p:notes>
+</file>
+
+<file path=ppt/notesSlides/notesSlide2.xml><?xml version="1.0" encoding="utf-8"?>
+<p:notes xmlns:a="http://schemas.openxmlformats.org/drawingml/2006/main" xmlns:r="http://schemas.openxmlformats.org/officeDocument/2006/relationships" xmlns:p="http://schemas.openxmlformats.org/presentationml/2006/main">
+  <p:cSld>
+    <p:spTree>
+      <p:nvGrpSpPr>
+        <p:cNvPr id="1" name=""/>
+        <p:cNvGrpSpPr/>
+        <p:nvPr/>
+      </p:nvGrpSpPr>
+      <p:grpSpPr>
+        <a:xfrm>
+          <a:off x="0" y="0"/>
+          <a:ext cx="0" cy="0"/>
+          <a:chOff x="0" y="0"/>
+          <a:chExt cx="0" cy="0"/>
+        </a:xfrm>
+      </p:grpSpPr>
+      <p:sp>
+        <p:nvSpPr>
+          <p:cNvPr id="2" name="Marcador de imagen de diapositiva 1"/>
+          <p:cNvSpPr>
+            <a:spLocks noGrp="1" noRot="1" noChangeAspect="1"/>
+          </p:cNvSpPr>
+          <p:nvPr>
+            <p:ph type="sldImg"/>
+          </p:nvPr>
+        </p:nvSpPr>
+        <p:spPr/>
+      </p:sp>
+      <p:sp>
+        <p:nvSpPr>
+          <p:cNvPr id="3" name="Marcador de notas 2"/>
+          <p:cNvSpPr>
+            <a:spLocks noGrp="1"/>
+          </p:cNvSpPr>
+          <p:nvPr>
+            <p:ph type="body" idx="1"/>
+          </p:nvPr>
+        </p:nvSpPr>
+        <p:spPr/>
+        <p:txBody>
+          <a:bodyPr/>
+          <a:lstStyle/>
+          <a:p>
+            <a:endParaRPr lang="es-ES" dirty="0"/>
+          </a:p>
+        </p:txBody>
+      </p:sp>
+      <p:sp>
+        <p:nvSpPr>
+          <p:cNvPr id="4" name="Marcador de número de diapositiva 3"/>
+          <p:cNvSpPr>
+            <a:spLocks noGrp="1"/>
+          </p:cNvSpPr>
+          <p:nvPr>
+            <p:ph type="sldNum" sz="quarter" idx="10"/>
+          </p:nvPr>
+        </p:nvSpPr>
+        <p:spPr/>
+        <p:txBody>
+          <a:bodyPr/>
+          <a:lstStyle/>
+          <a:p>
+            <a:fld id="{BF40B89A-BFCF-4B1B-94EA-9BC65E5FCF75}" type="slidenum">
+              <a:rPr lang="es-ES" smtClean="0"/>
+              <a:t>10</a:t>
+            </a:fld>
+            <a:endParaRPr lang="es-ES"/>
+          </a:p>
+        </p:txBody>
+      </p:sp>
+    </p:spTree>
+    <p:extLst>
+      <p:ext uri="{BB962C8B-B14F-4D97-AF65-F5344CB8AC3E}">
+        <p14:creationId xmlns:p14="http://schemas.microsoft.com/office/powerpoint/2010/main" val="1968536117"/>
+      </p:ext>
+    </p:extLst>
+  </p:cSld>
+  <p:clrMapOvr>
+    <a:masterClrMapping/>
+  </p:clrMapOvr>
+</p:notes>
+</file>
+
+<file path=ppt/notesSlides/notesSlide3.xml><?xml version="1.0" encoding="utf-8"?>
+<p:notes xmlns:a="http://schemas.openxmlformats.org/drawingml/2006/main" xmlns:r="http://schemas.openxmlformats.org/officeDocument/2006/relationships" xmlns:p="http://schemas.openxmlformats.org/presentationml/2006/main">
+  <p:cSld>
+    <p:spTree>
+      <p:nvGrpSpPr>
+        <p:cNvPr id="1" name=""/>
+        <p:cNvGrpSpPr/>
+        <p:nvPr/>
+      </p:nvGrpSpPr>
+      <p:grpSpPr>
+        <a:xfrm>
+          <a:off x="0" y="0"/>
+          <a:ext cx="0" cy="0"/>
+          <a:chOff x="0" y="0"/>
+          <a:chExt cx="0" cy="0"/>
+        </a:xfrm>
+      </p:grpSpPr>
+      <p:sp>
+        <p:nvSpPr>
+          <p:cNvPr id="2" name="Marcador de imagen de diapositiva 1"/>
+          <p:cNvSpPr>
+            <a:spLocks noGrp="1" noRot="1" noChangeAspect="1"/>
+          </p:cNvSpPr>
+          <p:nvPr>
+            <p:ph type="sldImg"/>
+          </p:nvPr>
+        </p:nvSpPr>
+        <p:spPr/>
+      </p:sp>
+      <p:sp>
+        <p:nvSpPr>
+          <p:cNvPr id="3" name="Marcador de notas 2"/>
+          <p:cNvSpPr>
+            <a:spLocks noGrp="1"/>
+          </p:cNvSpPr>
+          <p:nvPr>
+            <p:ph type="body" idx="1"/>
+          </p:nvPr>
+        </p:nvSpPr>
+        <p:spPr/>
+        <p:txBody>
+          <a:bodyPr/>
+          <a:lstStyle/>
+          <a:p>
+            <a:endParaRPr lang="es-ES" dirty="0"/>
+          </a:p>
+        </p:txBody>
+      </p:sp>
+      <p:sp>
+        <p:nvSpPr>
+          <p:cNvPr id="4" name="Marcador de número de diapositiva 3"/>
+          <p:cNvSpPr>
+            <a:spLocks noGrp="1"/>
+          </p:cNvSpPr>
+          <p:nvPr>
+            <p:ph type="sldNum" sz="quarter" idx="10"/>
+          </p:nvPr>
+        </p:nvSpPr>
+        <p:spPr/>
+        <p:txBody>
+          <a:bodyPr/>
+          <a:lstStyle/>
+          <a:p>
+            <a:fld id="{BF40B89A-BFCF-4B1B-94EA-9BC65E5FCF75}" type="slidenum">
+              <a:rPr lang="es-ES" smtClean="0"/>
+              <a:t>13</a:t>
+            </a:fld>
+            <a:endParaRPr lang="es-ES"/>
+          </a:p>
+        </p:txBody>
+      </p:sp>
+    </p:spTree>
+    <p:extLst>
+      <p:ext uri="{BB962C8B-B14F-4D97-AF65-F5344CB8AC3E}">
+        <p14:creationId xmlns:p14="http://schemas.microsoft.com/office/powerpoint/2010/main" val="2391199422"/>
+      </p:ext>
+    </p:extLst>
+  </p:cSld>
+  <p:clrMapOvr>
+    <a:masterClrMapping/>
+  </p:clrMapOvr>
+</p:notes>
+</file>
+
 <file path=ppt/slideLayouts/slideLayout1.xml><?xml version="1.0" encoding="utf-8"?>
 <p:sldLayout xmlns:a="http://schemas.openxmlformats.org/drawingml/2006/main" xmlns:r="http://schemas.openxmlformats.org/officeDocument/2006/relationships" xmlns:p="http://schemas.openxmlformats.org/presentationml/2006/main" type="title" preserve="1">
   <p:cSld name="Diapositiva de título">
@@ -717,7 +974,7 @@
             <a:fld id="{B61BEF0D-F0BB-DE4B-95CE-6DB70DBA9567}" type="datetimeFigureOut">
               <a:rPr lang="en-US" smtClean="0"/>
               <a:pPr/>
-              <a:t>12/15/2014</a:t>
+              <a:t>3/31/2017</a:t>
             </a:fld>
             <a:endParaRPr lang="en-US" dirty="0"/>
           </a:p>
@@ -966,7 +1223,7 @@
             <a:fld id="{B61BEF0D-F0BB-DE4B-95CE-6DB70DBA9567}" type="datetimeFigureOut">
               <a:rPr lang="en-US" smtClean="0"/>
               <a:pPr/>
-              <a:t>12/15/2014</a:t>
+              <a:t>3/31/2017</a:t>
             </a:fld>
             <a:endParaRPr lang="en-US" dirty="0"/>
           </a:p>
@@ -1203,7 +1460,7 @@
             <a:fld id="{B61BEF0D-F0BB-DE4B-95CE-6DB70DBA9567}" type="datetimeFigureOut">
               <a:rPr lang="en-US" smtClean="0"/>
               <a:pPr/>
-              <a:t>12/15/2014</a:t>
+              <a:t>3/31/2017</a:t>
             </a:fld>
             <a:endParaRPr lang="en-US" dirty="0"/>
           </a:p>
@@ -1435,7 +1692,7 @@
             <a:fld id="{B61BEF0D-F0BB-DE4B-95CE-6DB70DBA9567}" type="datetimeFigureOut">
               <a:rPr lang="en-US" smtClean="0"/>
               <a:pPr/>
-              <a:t>12/15/2014</a:t>
+              <a:t>3/31/2017</a:t>
             </a:fld>
             <a:endParaRPr lang="en-US" dirty="0"/>
           </a:p>
@@ -1739,7 +1996,7 @@
             <a:fld id="{B61BEF0D-F0BB-DE4B-95CE-6DB70DBA9567}" type="datetimeFigureOut">
               <a:rPr lang="en-US" smtClean="0"/>
               <a:pPr/>
-              <a:t>12/15/2014</a:t>
+              <a:t>3/31/2017</a:t>
             </a:fld>
             <a:endParaRPr lang="en-US" dirty="0"/>
           </a:p>
@@ -2038,7 +2295,7 @@
             <a:fld id="{B61BEF0D-F0BB-DE4B-95CE-6DB70DBA9567}" type="datetimeFigureOut">
               <a:rPr lang="en-US" smtClean="0"/>
               <a:pPr/>
-              <a:t>12/15/2014</a:t>
+              <a:t>3/31/2017</a:t>
             </a:fld>
             <a:endParaRPr lang="en-US" dirty="0"/>
           </a:p>
@@ -2461,7 +2718,7 @@
             <a:fld id="{B61BEF0D-F0BB-DE4B-95CE-6DB70DBA9567}" type="datetimeFigureOut">
               <a:rPr lang="en-US" smtClean="0"/>
               <a:pPr/>
-              <a:t>12/15/2014</a:t>
+              <a:t>3/31/2017</a:t>
             </a:fld>
             <a:endParaRPr lang="en-US" dirty="0"/>
           </a:p>
@@ -2620,7 +2877,7 @@
             <a:fld id="{B61BEF0D-F0BB-DE4B-95CE-6DB70DBA9567}" type="datetimeFigureOut">
               <a:rPr lang="en-US" smtClean="0"/>
               <a:pPr/>
-              <a:t>12/15/2014</a:t>
+              <a:t>3/31/2017</a:t>
             </a:fld>
             <a:endParaRPr lang="en-US" dirty="0"/>
           </a:p>
@@ -2717,7 +2974,7 @@
             <a:fld id="{B61BEF0D-F0BB-DE4B-95CE-6DB70DBA9567}" type="datetimeFigureOut">
               <a:rPr lang="en-US" smtClean="0"/>
               <a:pPr/>
-              <a:t>12/15/2014</a:t>
+              <a:t>3/31/2017</a:t>
             </a:fld>
             <a:endParaRPr lang="en-US" dirty="0"/>
           </a:p>
@@ -3097,7 +3354,7 @@
             <a:fld id="{B61BEF0D-F0BB-DE4B-95CE-6DB70DBA9567}" type="datetimeFigureOut">
               <a:rPr lang="en-US" smtClean="0"/>
               <a:pPr/>
-              <a:t>12/15/2014</a:t>
+              <a:t>3/31/2017</a:t>
             </a:fld>
             <a:endParaRPr lang="en-US" dirty="0"/>
           </a:p>
@@ -3388,7 +3645,7 @@
             <a:fld id="{B61BEF0D-F0BB-DE4B-95CE-6DB70DBA9567}" type="datetimeFigureOut">
               <a:rPr lang="en-US" smtClean="0"/>
               <a:pPr/>
-              <a:t>12/15/2014</a:t>
+              <a:t>3/31/2017</a:t>
             </a:fld>
             <a:endParaRPr lang="en-US" dirty="0"/>
           </a:p>
@@ -3601,7 +3858,7 @@
             <a:fld id="{B61BEF0D-F0BB-DE4B-95CE-6DB70DBA9567}" type="datetimeFigureOut">
               <a:rPr lang="en-US" smtClean="0"/>
               <a:pPr/>
-              <a:t>12/15/2014</a:t>
+              <a:t>3/31/2017</a:t>
             </a:fld>
             <a:endParaRPr lang="en-US" dirty="0"/>
           </a:p>
@@ -4220,7 +4477,7 @@
           <a:p>
             <a:r>
               <a:rPr lang="es-ES" dirty="0" smtClean="0"/>
-              <a:t>Introducción mínima a </a:t>
+              <a:t>INVITACIÓN a </a:t>
             </a:r>
             <a:r>
               <a:rPr lang="es-ES" dirty="0" smtClean="0"/>
@@ -4337,14 +4594,6 @@
               </a:rPr>
               <a:t>http://openprocessing.org/</a:t>
             </a:r>
-            <a:endParaRPr lang="es-ES" sz="1350" dirty="0">
-              <a:solidFill>
-                <a:schemeClr val="accent3">
-                  <a:lumMod val="60000"/>
-                  <a:lumOff val="40000"/>
-                </a:schemeClr>
-              </a:solidFill>
-            </a:endParaRPr>
           </a:p>
         </p:txBody>
       </p:sp>
@@ -4443,7 +4692,11 @@
           <a:p>
             <a:r>
               <a:rPr lang="es-ES" dirty="0" smtClean="0"/>
-              <a:t>Manejadores de eventos</a:t>
+              <a:t>INTERACTIVIDAD BÁSICA: Manejadores </a:t>
+            </a:r>
+            <a:r>
+              <a:rPr lang="es-ES" dirty="0" smtClean="0"/>
+              <a:t>de eventos</a:t>
             </a:r>
             <a:endParaRPr lang="es-ES" dirty="0"/>
           </a:p>
@@ -4489,7 +4742,15 @@
             </a:r>
             <a:r>
               <a:rPr lang="es-ES" dirty="0" smtClean="0"/>
-              <a:t>() tienen especial importancia las funciones de manejo de eventos porque permiten interaccionar con el mundo exterior. </a:t>
+              <a:t>() tienen especial importancia las funciones </a:t>
+            </a:r>
+            <a:r>
+              <a:rPr lang="es-ES" dirty="0" smtClean="0"/>
+              <a:t>de </a:t>
+            </a:r>
+            <a:r>
+              <a:rPr lang="es-ES" dirty="0" smtClean="0"/>
+              <a:t>manejo de eventos porque permiten interaccionar con el mundo exterior. </a:t>
             </a:r>
           </a:p>
           <a:p>
@@ -4638,7 +4899,7 @@
           <a:p>
             <a:r>
               <a:rPr lang="es-ES" dirty="0" smtClean="0"/>
-              <a:t>Pasos a seguir</a:t>
+              <a:t>Librerías: crecer con los otros</a:t>
             </a:r>
             <a:endParaRPr lang="es-ES" dirty="0"/>
           </a:p>
@@ -4646,7 +4907,7 @@
       </p:sp>
       <p:sp>
         <p:nvSpPr>
-          <p:cNvPr id="3" name="Marcador de contenido 2"/>
+          <p:cNvPr id="4" name="Marcador de contenido 3"/>
           <p:cNvSpPr>
             <a:spLocks noGrp="1"/>
           </p:cNvSpPr>
@@ -4654,117 +4915,116 @@
             <p:ph idx="1"/>
           </p:nvPr>
         </p:nvSpPr>
-        <p:spPr>
-          <a:xfrm>
-            <a:off x="581192" y="2228003"/>
-            <a:ext cx="7989752" cy="4334843"/>
-          </a:xfrm>
-        </p:spPr>
+        <p:spPr/>
         <p:txBody>
           <a:bodyPr>
-            <a:normAutofit/>
+            <a:normAutofit fontScale="92500" lnSpcReduction="10000"/>
           </a:bodyPr>
           <a:lstStyle/>
           <a:p>
             <a:r>
               <a:rPr lang="es-ES" dirty="0" smtClean="0"/>
-              <a:t>Instalar el IDE de </a:t>
-            </a:r>
-            <a:r>
-              <a:rPr lang="es-ES" dirty="0" smtClean="0"/>
-              <a:t>Processing. </a:t>
-            </a:r>
-            <a:r>
-              <a:rPr lang="es-ES" b="1" dirty="0"/>
-              <a:t>https://www.processing.org/ </a:t>
-            </a:r>
-            <a:endParaRPr lang="es-ES" b="1" dirty="0" smtClean="0"/>
-          </a:p>
-          <a:p>
-            <a:r>
-              <a:rPr lang="es-ES" dirty="0" smtClean="0"/>
-              <a:t>Proponerse un proyecto nuevo…. así según vayamos aprendiendo iremos evaluando si eso será útil a nuestro proyecto.</a:t>
-            </a:r>
-          </a:p>
-          <a:p>
-            <a:r>
-              <a:rPr lang="es-ES" dirty="0" smtClean="0"/>
-              <a:t>Ejecutar y modificar los ejemplos que vienen con Processing. </a:t>
-            </a:r>
-          </a:p>
-          <a:p>
-            <a:r>
-              <a:rPr lang="es-ES" dirty="0" smtClean="0"/>
-              <a:t>Buscar en </a:t>
-            </a:r>
-            <a:r>
-              <a:rPr lang="es-ES" sz="2400" b="1" dirty="0" err="1" smtClean="0"/>
-              <a:t>OpenProcessing</a:t>
-            </a:r>
-            <a:r>
-              <a:rPr lang="es-ES" sz="2400" dirty="0" smtClean="0"/>
+              <a:t>Las librerías son fragmentos de código reusables y documentados que permiten reusar el trabajo de otros programadores.</a:t>
+            </a:r>
+          </a:p>
+          <a:p>
+            <a:r>
+              <a:rPr lang="es-ES" dirty="0" smtClean="0"/>
+              <a:t>Hoy en día nadie se plantea empezar a programar algo sin investigar antes qué librerías podrían serle de utilidad.</a:t>
+            </a:r>
+          </a:p>
+          <a:p>
+            <a:r>
+              <a:rPr lang="es-ES" dirty="0" smtClean="0"/>
+              <a:t>Processing es una librería en si misma. </a:t>
+            </a:r>
+          </a:p>
+          <a:p>
+            <a:r>
+              <a:rPr lang="es-ES" dirty="0" smtClean="0"/>
+              <a:t>Dentro de una librería se pueden usar librerías adicionales. </a:t>
+            </a:r>
+          </a:p>
+          <a:p>
+            <a:r>
+              <a:rPr lang="es-ES" dirty="0" smtClean="0"/>
+              <a:t>El IDE de Processing permite instalar librerías y usarlas. </a:t>
+            </a:r>
+          </a:p>
+          <a:p>
+            <a:r>
+              <a:rPr lang="es-ES" dirty="0" smtClean="0"/>
+              <a:t>En Processing hay librerías incluidas en el software y otras que se han de instalar previamente (</a:t>
+            </a:r>
+            <a:r>
+              <a:rPr lang="es-ES" dirty="0" err="1" smtClean="0"/>
+              <a:t>Contributed</a:t>
+            </a:r>
+            <a:r>
+              <a:rPr lang="es-ES" dirty="0" smtClean="0"/>
               <a:t> </a:t>
             </a:r>
             <a:r>
-              <a:rPr lang="es-ES" dirty="0" smtClean="0"/>
-              <a:t>un proyecto ya realizado, estudiarlo, entenderlo, y modificarlo. </a:t>
-            </a:r>
-          </a:p>
-          <a:p>
-            <a:pPr lvl="1"/>
-            <a:r>
-              <a:rPr lang="es-ES" dirty="0">
-                <a:hlinkClick r:id="rId2"/>
-              </a:rPr>
-              <a:t>http://openprocessing.org/browse/?</a:t>
-            </a:r>
-            <a:r>
-              <a:rPr lang="es-ES" dirty="0" smtClean="0">
-                <a:hlinkClick r:id="rId2"/>
-              </a:rPr>
-              <a:t>viewBy=most&amp;filter=favorited</a:t>
+              <a:rPr lang="es-ES" dirty="0" err="1" smtClean="0"/>
+              <a:t>Libraries</a:t>
+            </a:r>
+            <a:r>
+              <a:rPr lang="es-ES" dirty="0" smtClean="0"/>
+              <a:t>). </a:t>
+            </a:r>
+          </a:p>
+          <a:p>
+            <a:r>
+              <a:rPr lang="es-ES" dirty="0" smtClean="0"/>
+              <a:t>Para usar una librería se usa la palabra reservada </a:t>
+            </a:r>
+            <a:r>
+              <a:rPr lang="es-ES" dirty="0" err="1" smtClean="0"/>
+              <a:t>import</a:t>
+            </a:r>
+            <a:r>
+              <a:rPr lang="es-ES" dirty="0" smtClean="0"/>
+              <a:t>:  </a:t>
+            </a:r>
+          </a:p>
+          <a:p>
+            <a:pPr marL="0" indent="0" algn="ctr">
+              <a:buNone/>
+            </a:pPr>
+            <a:r>
+              <a:rPr lang="es-ES" dirty="0" smtClean="0"/>
+              <a:t>Ejemplo:  </a:t>
+            </a:r>
+            <a:r>
+              <a:rPr lang="es-ES" dirty="0" err="1" smtClean="0"/>
+              <a:t>import</a:t>
             </a:r>
             <a:r>
               <a:rPr lang="es-ES" dirty="0" smtClean="0"/>
               <a:t> </a:t>
             </a:r>
+            <a:r>
+              <a:rPr lang="es-ES" dirty="0" err="1"/>
+              <a:t>processing.serial</a:t>
+            </a:r>
+            <a:r>
+              <a:rPr lang="es-ES" dirty="0"/>
+              <a:t>.*;</a:t>
+            </a:r>
+            <a:endParaRPr lang="es-ES" dirty="0" smtClean="0"/>
+          </a:p>
+          <a:p>
+            <a:pPr marL="0" indent="0">
+              <a:buNone/>
+            </a:pPr>
             <a:endParaRPr lang="es-ES" dirty="0"/>
-          </a:p>
-          <a:p>
-            <a:r>
-              <a:rPr lang="es-ES" dirty="0" smtClean="0"/>
-              <a:t>Aprender Java básico….</a:t>
-            </a:r>
-          </a:p>
-          <a:p>
-            <a:r>
-              <a:rPr lang="es-ES" dirty="0" smtClean="0"/>
-              <a:t>Para meterse en proyectos complejos es mejor usar un IDE profesional como Eclipse o </a:t>
-            </a:r>
-            <a:r>
-              <a:rPr lang="es-ES" dirty="0" err="1" smtClean="0"/>
-              <a:t>NetBeans</a:t>
-            </a:r>
-            <a:r>
-              <a:rPr lang="es-ES" dirty="0" smtClean="0"/>
-              <a:t> pues tienen depurador.</a:t>
-            </a:r>
-          </a:p>
-          <a:p>
-            <a:endParaRPr lang="es-ES" dirty="0" smtClean="0"/>
-          </a:p>
-          <a:p>
-            <a:endParaRPr lang="es-ES" dirty="0" smtClean="0"/>
-          </a:p>
-          <a:p>
-            <a:endParaRPr lang="es-ES" dirty="0" smtClean="0"/>
           </a:p>
         </p:txBody>
       </p:sp>
     </p:spTree>
     <p:extLst>
       <p:ext uri="{BB962C8B-B14F-4D97-AF65-F5344CB8AC3E}">
-        <p14:creationId xmlns:p14="http://schemas.microsoft.com/office/powerpoint/2010/main" val="1689878665"/>
+        <p14:creationId xmlns:p14="http://schemas.microsoft.com/office/powerpoint/2010/main" val="3737990546"/>
       </p:ext>
     </p:extLst>
   </p:cSld>
@@ -4815,7 +5075,7 @@
           <a:p>
             <a:r>
               <a:rPr lang="es-ES" dirty="0" smtClean="0"/>
-              <a:t>Bibliografía, tutoriales y proyectos</a:t>
+              <a:t>TERMINOLOGÍA: TIPOS DE DATOS, FUNCIONES, CLASES Y OBJETOS</a:t>
             </a:r>
             <a:endParaRPr lang="es-ES" dirty="0"/>
           </a:p>
@@ -4823,7 +5083,7 @@
       </p:sp>
       <p:sp>
         <p:nvSpPr>
-          <p:cNvPr id="3" name="Marcador de contenido 2"/>
+          <p:cNvPr id="5" name="Marcador de contenido 3"/>
           <p:cNvSpPr>
             <a:spLocks noGrp="1"/>
           </p:cNvSpPr>
@@ -4833,8 +5093,400 @@
         </p:nvSpPr>
         <p:spPr>
           <a:xfrm>
-            <a:off x="439962" y="2498102"/>
-            <a:ext cx="8272211" cy="3733014"/>
+            <a:off x="486138" y="2337847"/>
+            <a:ext cx="8221968" cy="3386371"/>
+          </a:xfrm>
+        </p:spPr>
+        <p:txBody>
+          <a:bodyPr anchor="t">
+            <a:normAutofit lnSpcReduction="10000"/>
+          </a:bodyPr>
+          <a:lstStyle/>
+          <a:p>
+            <a:r>
+              <a:rPr lang="es-ES" dirty="0" smtClean="0"/>
+              <a:t>Todos los lenguajes manejan datos que almacenan en memoria dinámica. Los datos pueden ser de distintos </a:t>
+            </a:r>
+            <a:r>
+              <a:rPr lang="es-ES" b="1" u="sng" dirty="0" smtClean="0"/>
+              <a:t>tipos</a:t>
+            </a:r>
+            <a:r>
+              <a:rPr lang="es-ES" dirty="0" smtClean="0"/>
+              <a:t> y es algo fundamental en todos los lenguajes de programación manejar distintos tipos de datos.</a:t>
+            </a:r>
+          </a:p>
+          <a:p>
+            <a:r>
+              <a:rPr lang="es-ES" dirty="0" smtClean="0"/>
+              <a:t>Los programas no son mas que conjuntos de órdenes para procesar distintos tipos de datos de diversas formas.  </a:t>
+            </a:r>
+          </a:p>
+          <a:p>
+            <a:r>
+              <a:rPr lang="es-ES" dirty="0" smtClean="0"/>
+              <a:t>Cuando un conjunto de ordenes la vamos a repetir varias veces, hacemos una función para no tener que escribirla una y otra vez. </a:t>
+            </a:r>
+          </a:p>
+          <a:p>
+            <a:r>
+              <a:rPr lang="es-ES" dirty="0" smtClean="0"/>
+              <a:t>Los lenguajes orientados a </a:t>
+            </a:r>
+            <a:r>
+              <a:rPr lang="es-ES" b="1" dirty="0" smtClean="0"/>
+              <a:t>objetos</a:t>
+            </a:r>
+            <a:r>
+              <a:rPr lang="es-ES" dirty="0" smtClean="0"/>
+              <a:t>, encapsulan las estructuras de datos junto a las funciones que los manejan en estructuras denominadas </a:t>
+            </a:r>
+            <a:r>
+              <a:rPr lang="es-ES" b="1" dirty="0" smtClean="0"/>
+              <a:t>clases</a:t>
+            </a:r>
+            <a:endParaRPr lang="es-ES" b="1" dirty="0"/>
+          </a:p>
+        </p:txBody>
+      </p:sp>
+    </p:spTree>
+    <p:extLst>
+      <p:ext uri="{BB962C8B-B14F-4D97-AF65-F5344CB8AC3E}">
+        <p14:creationId xmlns:p14="http://schemas.microsoft.com/office/powerpoint/2010/main" val="1419523615"/>
+      </p:ext>
+    </p:extLst>
+  </p:cSld>
+  <p:clrMapOvr>
+    <a:masterClrMapping/>
+  </p:clrMapOvr>
+  <p:timing>
+    <p:tnLst>
+      <p:par>
+        <p:cTn id="1" dur="indefinite" restart="never" nodeType="tmRoot"/>
+      </p:par>
+    </p:tnLst>
+  </p:timing>
+</p:sld>
+</file>
+
+<file path=ppt/slides/slide13.xml><?xml version="1.0" encoding="utf-8"?>
+<p:sld xmlns:a="http://schemas.openxmlformats.org/drawingml/2006/main" xmlns:r="http://schemas.openxmlformats.org/officeDocument/2006/relationships" xmlns:p="http://schemas.openxmlformats.org/presentationml/2006/main">
+  <p:cSld>
+    <p:spTree>
+      <p:nvGrpSpPr>
+        <p:cNvPr id="1" name=""/>
+        <p:cNvGrpSpPr/>
+        <p:nvPr/>
+      </p:nvGrpSpPr>
+      <p:grpSpPr>
+        <a:xfrm>
+          <a:off x="0" y="0"/>
+          <a:ext cx="0" cy="0"/>
+          <a:chOff x="0" y="0"/>
+          <a:chExt cx="0" cy="0"/>
+        </a:xfrm>
+      </p:grpSpPr>
+      <p:sp>
+        <p:nvSpPr>
+          <p:cNvPr id="2" name="Título 1"/>
+          <p:cNvSpPr>
+            <a:spLocks noGrp="1"/>
+          </p:cNvSpPr>
+          <p:nvPr>
+            <p:ph type="title"/>
+          </p:nvPr>
+        </p:nvSpPr>
+        <p:spPr/>
+        <p:txBody>
+          <a:bodyPr/>
+          <a:lstStyle/>
+          <a:p>
+            <a:r>
+              <a:rPr lang="es-ES" dirty="0" smtClean="0"/>
+              <a:t>Bibliografía, tutoriales y proyectos</a:t>
+            </a:r>
+            <a:endParaRPr lang="es-ES" dirty="0"/>
+          </a:p>
+        </p:txBody>
+      </p:sp>
+      <p:sp>
+        <p:nvSpPr>
+          <p:cNvPr id="3" name="Marcador de contenido 2"/>
+          <p:cNvSpPr>
+            <a:spLocks noGrp="1"/>
+          </p:cNvSpPr>
+          <p:nvPr>
+            <p:ph idx="1"/>
+          </p:nvPr>
+        </p:nvSpPr>
+        <p:spPr>
+          <a:xfrm>
+            <a:off x="439962" y="2335428"/>
+            <a:ext cx="8272211" cy="3892378"/>
+          </a:xfrm>
+        </p:spPr>
+        <p:txBody>
+          <a:bodyPr>
+            <a:normAutofit fontScale="92500" lnSpcReduction="20000"/>
+          </a:bodyPr>
+          <a:lstStyle/>
+          <a:p>
+            <a:pPr marL="0" indent="0">
+              <a:buNone/>
+            </a:pPr>
+            <a:r>
+              <a:rPr lang="es-ES" b="1" dirty="0"/>
+              <a:t>APRENDER </a:t>
+            </a:r>
+            <a:r>
+              <a:rPr lang="es-ES" b="1" dirty="0" smtClean="0"/>
+              <a:t>PROCESSING</a:t>
+            </a:r>
+            <a:endParaRPr lang="es-ES" b="1" dirty="0"/>
+          </a:p>
+          <a:p>
+            <a:r>
+              <a:rPr lang="es-ES" b="1" dirty="0" smtClean="0">
+                <a:hlinkClick r:id="rId3"/>
+              </a:rPr>
+              <a:t>https</a:t>
+            </a:r>
+            <a:r>
+              <a:rPr lang="es-ES" b="1" dirty="0">
+                <a:hlinkClick r:id="rId3"/>
+              </a:rPr>
+              <a:t>://www.processing.org/tutorials/gettingstarted/</a:t>
+            </a:r>
+            <a:r>
+              <a:rPr lang="es-ES" b="1" dirty="0"/>
+              <a:t> </a:t>
+            </a:r>
+          </a:p>
+          <a:p>
+            <a:r>
+              <a:rPr lang="es-ES" b="1" dirty="0" smtClean="0">
+                <a:hlinkClick r:id="rId4"/>
+              </a:rPr>
+              <a:t>http</a:t>
+            </a:r>
+            <a:r>
+              <a:rPr lang="es-ES" b="1" dirty="0">
+                <a:hlinkClick r:id="rId4"/>
+              </a:rPr>
+              <a:t>://</a:t>
+            </a:r>
+            <a:r>
+              <a:rPr lang="es-ES" b="1" dirty="0" smtClean="0">
+                <a:hlinkClick r:id="rId4"/>
+              </a:rPr>
+              <a:t>openprocessing.org/browse/</a:t>
+            </a:r>
+            <a:r>
+              <a:rPr lang="es-ES" b="1" dirty="0" smtClean="0"/>
+              <a:t> </a:t>
+            </a:r>
+          </a:p>
+          <a:p>
+            <a:pPr marL="0" indent="0">
+              <a:buNone/>
+            </a:pPr>
+            <a:r>
+              <a:rPr lang="es-ES" b="1" dirty="0" smtClean="0"/>
+              <a:t>APRENDER HTML</a:t>
+            </a:r>
+          </a:p>
+          <a:p>
+            <a:r>
+              <a:rPr lang="es-ES" b="1" dirty="0">
+                <a:hlinkClick r:id="rId5"/>
+              </a:rPr>
+              <a:t>https://</a:t>
+            </a:r>
+            <a:r>
+              <a:rPr lang="es-ES" b="1" dirty="0" smtClean="0">
+                <a:hlinkClick r:id="rId5"/>
+              </a:rPr>
+              <a:t>www.w3schools.com/html/default.asp</a:t>
+            </a:r>
+            <a:r>
+              <a:rPr lang="es-ES" b="1" dirty="0" smtClean="0"/>
+              <a:t> </a:t>
+            </a:r>
+            <a:endParaRPr lang="es-ES" b="1" dirty="0" smtClean="0"/>
+          </a:p>
+          <a:p>
+            <a:pPr marL="0" indent="0">
+              <a:buNone/>
+            </a:pPr>
+            <a:r>
+              <a:rPr lang="es-ES" b="1" dirty="0" smtClean="0"/>
+              <a:t>APRENDER JAVASCRIPT</a:t>
+            </a:r>
+          </a:p>
+          <a:p>
+            <a:r>
+              <a:rPr lang="es-ES" b="1" dirty="0">
+                <a:hlinkClick r:id="rId6"/>
+              </a:rPr>
+              <a:t>https://www.w3schools.com/js</a:t>
+            </a:r>
+            <a:r>
+              <a:rPr lang="es-ES" b="1" dirty="0" smtClean="0">
+                <a:hlinkClick r:id="rId6"/>
+              </a:rPr>
+              <a:t>/</a:t>
+            </a:r>
+            <a:r>
+              <a:rPr lang="es-ES" b="1" dirty="0" smtClean="0"/>
+              <a:t> </a:t>
+            </a:r>
+          </a:p>
+          <a:p>
+            <a:pPr marL="0" indent="0">
+              <a:buNone/>
+            </a:pPr>
+            <a:r>
+              <a:rPr lang="es-ES" b="1" dirty="0" smtClean="0"/>
+              <a:t>APRNDER </a:t>
+            </a:r>
+            <a:r>
+              <a:rPr lang="es-ES" b="1" dirty="0"/>
+              <a:t>PROCESSING JS</a:t>
+            </a:r>
+          </a:p>
+          <a:p>
+            <a:pPr marL="0" indent="0">
+              <a:buNone/>
+            </a:pPr>
+            <a:r>
+              <a:rPr lang="es-ES" b="1" dirty="0">
+                <a:hlinkClick r:id="rId7"/>
+              </a:rPr>
+              <a:t>http://</a:t>
+            </a:r>
+            <a:r>
+              <a:rPr lang="es-ES" b="1" dirty="0" smtClean="0">
+                <a:hlinkClick r:id="rId7"/>
+              </a:rPr>
+              <a:t>processingjs.org/</a:t>
+            </a:r>
+            <a:endParaRPr lang="es-ES" b="1" dirty="0" smtClean="0"/>
+          </a:p>
+          <a:p>
+            <a:pPr marL="0" indent="0">
+              <a:buNone/>
+            </a:pPr>
+            <a:r>
+              <a:rPr lang="es-ES" b="1" dirty="0" smtClean="0"/>
+              <a:t>APRENDER </a:t>
+            </a:r>
+            <a:r>
+              <a:rPr lang="es-ES" b="1" dirty="0"/>
+              <a:t>JAVA</a:t>
+            </a:r>
+          </a:p>
+          <a:p>
+            <a:pPr>
+              <a:buFont typeface="Wingdings" panose="05000000000000000000" pitchFamily="2" charset="2"/>
+              <a:buChar char="§"/>
+            </a:pPr>
+            <a:r>
+              <a:rPr lang="es-ES" b="1" dirty="0">
+                <a:hlinkClick r:id="rId8"/>
+              </a:rPr>
+              <a:t>https://www.tutorialspoint.com/java/index.htm</a:t>
+            </a:r>
+            <a:r>
+              <a:rPr lang="es-ES" b="1" dirty="0"/>
+              <a:t>  </a:t>
+            </a:r>
+          </a:p>
+          <a:p>
+            <a:endParaRPr lang="es-ES" b="1" dirty="0"/>
+          </a:p>
+          <a:p>
+            <a:endParaRPr lang="es-ES" dirty="0" smtClean="0"/>
+          </a:p>
+        </p:txBody>
+      </p:sp>
+    </p:spTree>
+    <p:extLst>
+      <p:ext uri="{BB962C8B-B14F-4D97-AF65-F5344CB8AC3E}">
+        <p14:creationId xmlns:p14="http://schemas.microsoft.com/office/powerpoint/2010/main" val="399147724"/>
+      </p:ext>
+    </p:extLst>
+  </p:cSld>
+  <p:clrMapOvr>
+    <a:masterClrMapping/>
+  </p:clrMapOvr>
+  <p:timing>
+    <p:tnLst>
+      <p:par>
+        <p:cTn id="1" dur="indefinite" restart="never" nodeType="tmRoot"/>
+      </p:par>
+    </p:tnLst>
+  </p:timing>
+</p:sld>
+</file>
+
+<file path=ppt/slides/slide14.xml><?xml version="1.0" encoding="utf-8"?>
+<p:sld xmlns:a="http://schemas.openxmlformats.org/drawingml/2006/main" xmlns:r="http://schemas.openxmlformats.org/officeDocument/2006/relationships" xmlns:p="http://schemas.openxmlformats.org/presentationml/2006/main">
+  <p:cSld>
+    <p:spTree>
+      <p:nvGrpSpPr>
+        <p:cNvPr id="1" name=""/>
+        <p:cNvGrpSpPr/>
+        <p:nvPr/>
+      </p:nvGrpSpPr>
+      <p:grpSpPr>
+        <a:xfrm>
+          <a:off x="0" y="0"/>
+          <a:ext cx="0" cy="0"/>
+          <a:chOff x="0" y="0"/>
+          <a:chExt cx="0" cy="0"/>
+        </a:xfrm>
+      </p:grpSpPr>
+      <p:sp>
+        <p:nvSpPr>
+          <p:cNvPr id="2" name="Título 1"/>
+          <p:cNvSpPr>
+            <a:spLocks noGrp="1"/>
+          </p:cNvSpPr>
+          <p:nvPr>
+            <p:ph type="title"/>
+          </p:nvPr>
+        </p:nvSpPr>
+        <p:spPr/>
+        <p:txBody>
+          <a:bodyPr/>
+          <a:lstStyle/>
+          <a:p>
+            <a:r>
+              <a:rPr lang="es-ES" dirty="0" smtClean="0"/>
+              <a:t>Nociones de java: TIPOS </a:t>
+            </a:r>
+            <a:r>
+              <a:rPr lang="es-ES" dirty="0" smtClean="0"/>
+              <a:t>DE DATOS PRIMITIVOS</a:t>
+            </a:r>
+            <a:endParaRPr lang="es-ES" dirty="0"/>
+          </a:p>
+        </p:txBody>
+      </p:sp>
+      <p:sp>
+        <p:nvSpPr>
+          <p:cNvPr id="3" name="Marcador de contenido 2"/>
+          <p:cNvSpPr>
+            <a:spLocks noGrp="1"/>
+          </p:cNvSpPr>
+          <p:nvPr>
+            <p:ph idx="1"/>
+          </p:nvPr>
+        </p:nvSpPr>
+        <p:spPr>
+          <a:xfrm>
+            <a:off x="581192" y="2060294"/>
+            <a:ext cx="7989751" cy="2770175"/>
           </a:xfrm>
         </p:spPr>
         <p:txBody>
@@ -4843,66 +5495,1115 @@
           </a:bodyPr>
           <a:lstStyle/>
           <a:p>
-            <a:r>
-              <a:rPr lang="es-ES" dirty="0">
-                <a:hlinkClick r:id="rId2"/>
-              </a:rPr>
-              <a:t>http://www.processing.org</a:t>
-            </a:r>
-            <a:r>
-              <a:rPr lang="es-ES" dirty="0" smtClean="0">
-                <a:hlinkClick r:id="rId2"/>
-              </a:rPr>
-              <a:t>/</a:t>
-            </a:r>
-            <a:endParaRPr lang="es-ES" dirty="0" smtClean="0"/>
-          </a:p>
-          <a:p>
+            <a:pPr>
+              <a:buFont typeface="Wingdings" panose="05000000000000000000" pitchFamily="2" charset="2"/>
+              <a:buChar char="§"/>
+            </a:pPr>
+            <a:r>
+              <a:rPr lang="es-ES" dirty="0" smtClean="0"/>
+              <a:t>En java hay tipos de datos “primitivos” y tipos de datos complejos. </a:t>
+            </a:r>
+          </a:p>
+          <a:p>
+            <a:pPr>
+              <a:buFont typeface="Wingdings" panose="05000000000000000000" pitchFamily="2" charset="2"/>
+              <a:buChar char="§"/>
+            </a:pPr>
+            <a:r>
+              <a:rPr lang="es-ES" dirty="0" smtClean="0"/>
+              <a:t>Para crear una variable de un tipo de dato primitivo, basta con declarar que queremos usarla y asignarle un nombre. Se hace así: </a:t>
+            </a:r>
+          </a:p>
+          <a:p>
+            <a:pPr marL="0" indent="0" algn="ctr">
+              <a:buNone/>
+            </a:pPr>
+            <a:r>
+              <a:rPr lang="es-ES" dirty="0" err="1"/>
+              <a:t>f</a:t>
+            </a:r>
+            <a:r>
+              <a:rPr lang="es-ES" dirty="0" err="1" smtClean="0"/>
+              <a:t>loat</a:t>
+            </a:r>
+            <a:r>
+              <a:rPr lang="es-ES" dirty="0" smtClean="0"/>
+              <a:t> distancia=0; </a:t>
+            </a:r>
+          </a:p>
+          <a:p>
+            <a:pPr marL="0" indent="0" algn="ctr">
+              <a:buNone/>
+            </a:pPr>
+            <a:endParaRPr lang="es-ES" dirty="0"/>
+          </a:p>
+          <a:p>
+            <a:pPr>
+              <a:buFont typeface="Wingdings" panose="05000000000000000000" pitchFamily="2" charset="2"/>
+              <a:buChar char="§"/>
+            </a:pPr>
+            <a:r>
+              <a:rPr lang="es-ES" dirty="0" smtClean="0"/>
+              <a:t>Los tipos de datos primitivos son: </a:t>
+            </a:r>
             <a:r>
               <a:rPr lang="es-ES" dirty="0"/>
-              <a:t>http://openprocessing.org/</a:t>
-            </a:r>
-            <a:endParaRPr lang="es-ES" dirty="0" smtClean="0"/>
-          </a:p>
-          <a:p>
-            <a:r>
-              <a:rPr lang="es-ES" dirty="0">
-                <a:hlinkClick r:id="rId3"/>
-              </a:rPr>
-              <a:t>http://www.sojamo.de/libraries/controlP5</a:t>
-            </a:r>
-            <a:r>
-              <a:rPr lang="es-ES" dirty="0" smtClean="0">
-                <a:hlinkClick r:id="rId3"/>
-              </a:rPr>
-              <a:t>/</a:t>
-            </a:r>
-            <a:endParaRPr lang="es-ES" dirty="0" smtClean="0"/>
-          </a:p>
-          <a:p>
-            <a:r>
-              <a:rPr lang="es-ES" dirty="0">
-                <a:hlinkClick r:id="rId4"/>
-              </a:rPr>
-              <a:t>http://</a:t>
-            </a:r>
-            <a:r>
-              <a:rPr lang="es-ES" dirty="0" smtClean="0">
-                <a:hlinkClick r:id="rId4"/>
-              </a:rPr>
-              <a:t>www.tutorialspoint.com/java/java_quick_guide.htm</a:t>
-            </a:r>
-            <a:endParaRPr lang="es-ES" dirty="0" smtClean="0"/>
-          </a:p>
-          <a:p>
-            <a:endParaRPr lang="es-ES" dirty="0" smtClean="0"/>
+              <a:t> </a:t>
+            </a:r>
+            <a:r>
+              <a:rPr lang="es-ES" dirty="0" smtClean="0"/>
+              <a:t>byte, short , </a:t>
+            </a:r>
+            <a:r>
+              <a:rPr lang="es-ES" dirty="0" err="1" smtClean="0"/>
+              <a:t>int</a:t>
+            </a:r>
+            <a:r>
+              <a:rPr lang="es-ES" dirty="0" smtClean="0"/>
+              <a:t> , </a:t>
+            </a:r>
+            <a:r>
+              <a:rPr lang="es-ES" dirty="0" err="1" smtClean="0"/>
+              <a:t>long</a:t>
+            </a:r>
+            <a:r>
+              <a:rPr lang="es-ES" dirty="0" smtClean="0"/>
+              <a:t> , </a:t>
+            </a:r>
+            <a:r>
+              <a:rPr lang="es-ES" dirty="0" err="1" smtClean="0"/>
+              <a:t>float</a:t>
+            </a:r>
+            <a:r>
+              <a:rPr lang="es-ES" dirty="0" smtClean="0"/>
+              <a:t>, </a:t>
+            </a:r>
+            <a:r>
+              <a:rPr lang="es-ES" dirty="0" err="1" smtClean="0"/>
+              <a:t>double</a:t>
+            </a:r>
+            <a:r>
+              <a:rPr lang="es-ES" dirty="0" smtClean="0"/>
+              <a:t>, </a:t>
+            </a:r>
+            <a:r>
+              <a:rPr lang="es-ES" dirty="0" err="1" smtClean="0"/>
+              <a:t>boolean</a:t>
+            </a:r>
+            <a:r>
+              <a:rPr lang="es-ES" dirty="0" smtClean="0"/>
+              <a:t>, </a:t>
+            </a:r>
+            <a:r>
+              <a:rPr lang="es-ES" dirty="0" err="1" smtClean="0"/>
+              <a:t>char</a:t>
+            </a:r>
+            <a:r>
+              <a:rPr lang="es-ES" dirty="0" smtClean="0"/>
+              <a:t>. </a:t>
+            </a:r>
+          </a:p>
+        </p:txBody>
+      </p:sp>
+      <p:sp>
+        <p:nvSpPr>
+          <p:cNvPr id="4" name="Rectángulo 3"/>
+          <p:cNvSpPr/>
+          <p:nvPr/>
+        </p:nvSpPr>
+        <p:spPr>
+          <a:xfrm>
+            <a:off x="581192" y="5608948"/>
+            <a:ext cx="8129175" cy="369332"/>
+          </a:xfrm>
+          <a:prstGeom prst="rect">
+            <a:avLst/>
+          </a:prstGeom>
+        </p:spPr>
+        <p:txBody>
+          <a:bodyPr wrap="square">
+            <a:spAutoFit/>
+          </a:bodyPr>
+          <a:lstStyle/>
+          <a:p>
+            <a:pPr algn="ctr"/>
+            <a:r>
+              <a:rPr lang="es-ES" dirty="0"/>
+              <a:t> </a:t>
+            </a:r>
+            <a:r>
+              <a:rPr lang="es-ES" b="1" dirty="0"/>
+              <a:t>http://www.tutorialspoint.com/java/java_basic_datatypes.htm</a:t>
+            </a:r>
+            <a:endParaRPr lang="es-ES" dirty="0"/>
           </a:p>
         </p:txBody>
       </p:sp>
     </p:spTree>
     <p:extLst>
       <p:ext uri="{BB962C8B-B14F-4D97-AF65-F5344CB8AC3E}">
-        <p14:creationId xmlns:p14="http://schemas.microsoft.com/office/powerpoint/2010/main" val="399147724"/>
+        <p14:creationId xmlns:p14="http://schemas.microsoft.com/office/powerpoint/2010/main" val="2235747137"/>
+      </p:ext>
+    </p:extLst>
+  </p:cSld>
+  <p:clrMapOvr>
+    <a:masterClrMapping/>
+  </p:clrMapOvr>
+  <p:timing>
+    <p:tnLst>
+      <p:par>
+        <p:cTn id="1" dur="indefinite" restart="never" nodeType="tmRoot"/>
+      </p:par>
+    </p:tnLst>
+  </p:timing>
+</p:sld>
+</file>
+
+<file path=ppt/slides/slide15.xml><?xml version="1.0" encoding="utf-8"?>
+<p:sld xmlns:a="http://schemas.openxmlformats.org/drawingml/2006/main" xmlns:r="http://schemas.openxmlformats.org/officeDocument/2006/relationships" xmlns:p="http://schemas.openxmlformats.org/presentationml/2006/main">
+  <p:cSld>
+    <p:spTree>
+      <p:nvGrpSpPr>
+        <p:cNvPr id="1" name=""/>
+        <p:cNvGrpSpPr/>
+        <p:nvPr/>
+      </p:nvGrpSpPr>
+      <p:grpSpPr>
+        <a:xfrm>
+          <a:off x="0" y="0"/>
+          <a:ext cx="0" cy="0"/>
+          <a:chOff x="0" y="0"/>
+          <a:chExt cx="0" cy="0"/>
+        </a:xfrm>
+      </p:grpSpPr>
+      <p:sp>
+        <p:nvSpPr>
+          <p:cNvPr id="2" name="Título 1"/>
+          <p:cNvSpPr>
+            <a:spLocks noGrp="1"/>
+          </p:cNvSpPr>
+          <p:nvPr>
+            <p:ph type="title"/>
+          </p:nvPr>
+        </p:nvSpPr>
+        <p:spPr/>
+        <p:txBody>
+          <a:bodyPr/>
+          <a:lstStyle/>
+          <a:p>
+            <a:r>
+              <a:rPr lang="es-ES" dirty="0"/>
+              <a:t>Nociones de java: TIPOS </a:t>
+            </a:r>
+            <a:r>
+              <a:rPr lang="es-ES" dirty="0" smtClean="0"/>
+              <a:t>DE DATOS COMPLEJOS, objetos</a:t>
+            </a:r>
+            <a:endParaRPr lang="es-ES" dirty="0"/>
+          </a:p>
+        </p:txBody>
+      </p:sp>
+      <p:sp>
+        <p:nvSpPr>
+          <p:cNvPr id="3" name="Marcador de contenido 2"/>
+          <p:cNvSpPr>
+            <a:spLocks noGrp="1"/>
+          </p:cNvSpPr>
+          <p:nvPr>
+            <p:ph idx="1"/>
+          </p:nvPr>
+        </p:nvSpPr>
+        <p:spPr>
+          <a:xfrm>
+            <a:off x="581192" y="2060293"/>
+            <a:ext cx="8342889" cy="4699321"/>
+          </a:xfrm>
+        </p:spPr>
+        <p:txBody>
+          <a:bodyPr>
+            <a:normAutofit fontScale="92500" lnSpcReduction="20000"/>
+          </a:bodyPr>
+          <a:lstStyle/>
+          <a:p>
+            <a:pPr>
+              <a:buFont typeface="Wingdings" panose="05000000000000000000" pitchFamily="2" charset="2"/>
+              <a:buChar char="§"/>
+            </a:pPr>
+            <a:r>
+              <a:rPr lang="es-ES" dirty="0" smtClean="0"/>
+              <a:t>Los tipos de datos complejos son objetos. </a:t>
+            </a:r>
+          </a:p>
+          <a:p>
+            <a:pPr>
+              <a:buFont typeface="Wingdings" panose="05000000000000000000" pitchFamily="2" charset="2"/>
+              <a:buChar char="§"/>
+            </a:pPr>
+            <a:r>
+              <a:rPr lang="es-ES" dirty="0" smtClean="0"/>
+              <a:t>Los objetos se definen mediante clases. </a:t>
+            </a:r>
+          </a:p>
+          <a:p>
+            <a:pPr>
+              <a:buFont typeface="Wingdings" panose="05000000000000000000" pitchFamily="2" charset="2"/>
+              <a:buChar char="§"/>
+            </a:pPr>
+            <a:r>
+              <a:rPr lang="es-ES" dirty="0" smtClean="0"/>
+              <a:t>Para usar uno objeto hay que declarar una definir la clase, declarar la variable y después crear el objeto con </a:t>
+            </a:r>
+            <a:r>
+              <a:rPr lang="es-ES" b="1" dirty="0" smtClean="0"/>
+              <a:t>new. </a:t>
+            </a:r>
+          </a:p>
+          <a:p>
+            <a:pPr>
+              <a:buFont typeface="Wingdings" panose="05000000000000000000" pitchFamily="2" charset="2"/>
+              <a:buChar char="§"/>
+            </a:pPr>
+            <a:r>
+              <a:rPr lang="es-ES" dirty="0" smtClean="0"/>
+              <a:t>En Processing ya hay definidas muchas clases muy útiles, pero para usarlas hay que declararlas y crearlas. Algo así:   </a:t>
+            </a:r>
+          </a:p>
+          <a:p>
+            <a:pPr marL="324000" lvl="1" indent="0">
+              <a:buNone/>
+            </a:pPr>
+            <a:r>
+              <a:rPr lang="es-ES" dirty="0" err="1" smtClean="0"/>
+              <a:t>public</a:t>
+            </a:r>
+            <a:r>
+              <a:rPr lang="es-ES" dirty="0" smtClean="0"/>
+              <a:t> </a:t>
+            </a:r>
+            <a:r>
+              <a:rPr lang="es-ES" dirty="0" err="1" smtClean="0"/>
+              <a:t>class</a:t>
+            </a:r>
+            <a:r>
+              <a:rPr lang="es-ES" dirty="0" smtClean="0"/>
+              <a:t> Punto</a:t>
+            </a:r>
+          </a:p>
+          <a:p>
+            <a:pPr marL="324000" lvl="1" indent="0">
+              <a:buNone/>
+            </a:pPr>
+            <a:r>
+              <a:rPr lang="es-ES" dirty="0" smtClean="0"/>
+              <a:t>{ </a:t>
+            </a:r>
+            <a:r>
+              <a:rPr lang="es-ES" dirty="0" err="1" smtClean="0"/>
+              <a:t>float</a:t>
+            </a:r>
+            <a:r>
+              <a:rPr lang="es-ES" dirty="0" smtClean="0"/>
+              <a:t> x;</a:t>
+            </a:r>
+          </a:p>
+          <a:p>
+            <a:pPr marL="324000" lvl="1" indent="0">
+              <a:buNone/>
+            </a:pPr>
+            <a:r>
+              <a:rPr lang="es-ES" dirty="0" err="1"/>
+              <a:t>f</a:t>
+            </a:r>
+            <a:r>
+              <a:rPr lang="es-ES" dirty="0" err="1" smtClean="0"/>
+              <a:t>loat</a:t>
+            </a:r>
+            <a:r>
+              <a:rPr lang="es-ES" dirty="0" smtClean="0"/>
+              <a:t> </a:t>
+            </a:r>
+            <a:r>
+              <a:rPr lang="es-ES" dirty="0" smtClean="0"/>
+              <a:t>y;</a:t>
+            </a:r>
+          </a:p>
+          <a:p>
+            <a:pPr marL="324000" lvl="1" indent="0">
+              <a:buNone/>
+            </a:pPr>
+            <a:r>
+              <a:rPr lang="es-ES" dirty="0" smtClean="0"/>
+              <a:t>Punto (</a:t>
+            </a:r>
+            <a:r>
+              <a:rPr lang="es-ES" dirty="0" err="1" smtClean="0"/>
+              <a:t>float</a:t>
+            </a:r>
+            <a:r>
+              <a:rPr lang="es-ES" dirty="0" smtClean="0"/>
+              <a:t> </a:t>
+            </a:r>
+            <a:r>
+              <a:rPr lang="es-ES" dirty="0" err="1" smtClean="0"/>
+              <a:t>x_inicial</a:t>
+            </a:r>
+            <a:r>
+              <a:rPr lang="es-ES" dirty="0" smtClean="0"/>
+              <a:t>, </a:t>
+            </a:r>
+            <a:r>
+              <a:rPr lang="es-ES" dirty="0" err="1" smtClean="0"/>
+              <a:t>float</a:t>
+            </a:r>
+            <a:r>
+              <a:rPr lang="es-ES" dirty="0" smtClean="0"/>
+              <a:t> </a:t>
+            </a:r>
+            <a:r>
+              <a:rPr lang="es-ES" dirty="0" err="1" smtClean="0"/>
+              <a:t>y_inicial</a:t>
+            </a:r>
+            <a:r>
+              <a:rPr lang="es-ES" dirty="0" smtClean="0"/>
+              <a:t>) { x=</a:t>
+            </a:r>
+            <a:r>
+              <a:rPr lang="es-ES" dirty="0" err="1" smtClean="0"/>
+              <a:t>x_inicial</a:t>
+            </a:r>
+            <a:r>
+              <a:rPr lang="es-ES" dirty="0" smtClean="0"/>
+              <a:t>; y=</a:t>
+            </a:r>
+            <a:r>
+              <a:rPr lang="es-ES" dirty="0" err="1" smtClean="0"/>
+              <a:t>y_inicial</a:t>
+            </a:r>
+            <a:r>
+              <a:rPr lang="es-ES" dirty="0" smtClean="0"/>
+              <a:t>;}</a:t>
+            </a:r>
+          </a:p>
+          <a:p>
+            <a:pPr marL="324000" lvl="1" indent="0">
+              <a:buNone/>
+            </a:pPr>
+            <a:r>
+              <a:rPr lang="es-ES" dirty="0" err="1"/>
+              <a:t>v</a:t>
+            </a:r>
+            <a:r>
+              <a:rPr lang="es-ES" dirty="0" err="1" smtClean="0"/>
+              <a:t>oid</a:t>
+            </a:r>
+            <a:r>
+              <a:rPr lang="es-ES" dirty="0" smtClean="0"/>
+              <a:t> Pinta() { </a:t>
+            </a:r>
+            <a:r>
+              <a:rPr lang="es-ES" dirty="0" err="1" smtClean="0"/>
+              <a:t>point</a:t>
+            </a:r>
+            <a:r>
+              <a:rPr lang="es-ES" dirty="0" smtClean="0"/>
+              <a:t> ( x, y);	}</a:t>
+            </a:r>
+          </a:p>
+          <a:p>
+            <a:pPr marL="324000" lvl="1" indent="0">
+              <a:buNone/>
+            </a:pPr>
+            <a:r>
+              <a:rPr lang="es-ES" dirty="0" err="1"/>
+              <a:t>v</a:t>
+            </a:r>
+            <a:r>
+              <a:rPr lang="es-ES" dirty="0" err="1" smtClean="0"/>
+              <a:t>oid</a:t>
+            </a:r>
+            <a:r>
+              <a:rPr lang="es-ES" dirty="0" smtClean="0"/>
+              <a:t> Desplaza(</a:t>
+            </a:r>
+            <a:r>
+              <a:rPr lang="es-ES" dirty="0" err="1" smtClean="0"/>
+              <a:t>float</a:t>
+            </a:r>
+            <a:r>
+              <a:rPr lang="es-ES" dirty="0" smtClean="0"/>
+              <a:t> </a:t>
+            </a:r>
+            <a:r>
+              <a:rPr lang="es-ES" dirty="0" err="1" smtClean="0"/>
+              <a:t>desplazaX</a:t>
+            </a:r>
+            <a:r>
+              <a:rPr lang="es-ES" dirty="0" smtClean="0"/>
+              <a:t>, </a:t>
+            </a:r>
+            <a:r>
+              <a:rPr lang="es-ES" dirty="0" err="1" smtClean="0"/>
+              <a:t>float</a:t>
+            </a:r>
+            <a:r>
+              <a:rPr lang="es-ES" dirty="0" smtClean="0"/>
+              <a:t> </a:t>
+            </a:r>
+            <a:r>
+              <a:rPr lang="es-ES" dirty="0" err="1" smtClean="0"/>
+              <a:t>desplazaY</a:t>
+            </a:r>
+            <a:r>
+              <a:rPr lang="es-ES" dirty="0" smtClean="0"/>
+              <a:t>) {x+=</a:t>
+            </a:r>
+            <a:r>
+              <a:rPr lang="es-ES" dirty="0" err="1" smtClean="0"/>
+              <a:t>desplazaX</a:t>
+            </a:r>
+            <a:r>
+              <a:rPr lang="es-ES" dirty="0" smtClean="0"/>
+              <a:t>; y+=</a:t>
+            </a:r>
+            <a:r>
+              <a:rPr lang="es-ES" dirty="0" err="1" smtClean="0"/>
+              <a:t>desplazaY</a:t>
+            </a:r>
+            <a:r>
+              <a:rPr lang="es-ES" dirty="0" smtClean="0"/>
+              <a:t>; }</a:t>
+            </a:r>
+          </a:p>
+          <a:p>
+            <a:pPr marL="324000" lvl="1" indent="0">
+              <a:buNone/>
+            </a:pPr>
+            <a:r>
+              <a:rPr lang="es-ES" dirty="0" smtClean="0"/>
+              <a:t>}</a:t>
+            </a:r>
+          </a:p>
+          <a:p>
+            <a:pPr marL="324000" lvl="1" indent="0">
+              <a:buNone/>
+            </a:pPr>
+            <a:r>
+              <a:rPr lang="es-ES" dirty="0" smtClean="0"/>
+              <a:t>Punto </a:t>
+            </a:r>
+            <a:r>
+              <a:rPr lang="es-ES" dirty="0" err="1" smtClean="0"/>
+              <a:t>m_punto</a:t>
+            </a:r>
+            <a:r>
+              <a:rPr lang="es-ES" dirty="0" smtClean="0"/>
+              <a:t> = new Punto(0, 0);</a:t>
+            </a:r>
+          </a:p>
+          <a:p>
+            <a:pPr marL="324000" lvl="1" indent="0">
+              <a:buNone/>
+            </a:pPr>
+            <a:r>
+              <a:rPr lang="es-ES" dirty="0" err="1" smtClean="0"/>
+              <a:t>m_punto.pinta</a:t>
+            </a:r>
+            <a:r>
+              <a:rPr lang="es-ES" dirty="0" smtClean="0"/>
+              <a:t>();</a:t>
+            </a:r>
+          </a:p>
+          <a:p>
+            <a:pPr>
+              <a:buFont typeface="Wingdings" panose="05000000000000000000" pitchFamily="2" charset="2"/>
+              <a:buChar char="§"/>
+            </a:pPr>
+            <a:endParaRPr lang="es-ES" b="1" dirty="0" smtClean="0"/>
+          </a:p>
+        </p:txBody>
+      </p:sp>
+    </p:spTree>
+    <p:extLst>
+      <p:ext uri="{BB962C8B-B14F-4D97-AF65-F5344CB8AC3E}">
+        <p14:creationId xmlns:p14="http://schemas.microsoft.com/office/powerpoint/2010/main" val="538810946"/>
+      </p:ext>
+    </p:extLst>
+  </p:cSld>
+  <p:clrMapOvr>
+    <a:masterClrMapping/>
+  </p:clrMapOvr>
+  <p:timing>
+    <p:tnLst>
+      <p:par>
+        <p:cTn id="1" dur="indefinite" restart="never" nodeType="tmRoot"/>
+      </p:par>
+    </p:tnLst>
+  </p:timing>
+</p:sld>
+</file>
+
+<file path=ppt/slides/slide16.xml><?xml version="1.0" encoding="utf-8"?>
+<p:sld xmlns:a="http://schemas.openxmlformats.org/drawingml/2006/main" xmlns:r="http://schemas.openxmlformats.org/officeDocument/2006/relationships" xmlns:p="http://schemas.openxmlformats.org/presentationml/2006/main">
+  <p:cSld>
+    <p:spTree>
+      <p:nvGrpSpPr>
+        <p:cNvPr id="1" name=""/>
+        <p:cNvGrpSpPr/>
+        <p:nvPr/>
+      </p:nvGrpSpPr>
+      <p:grpSpPr>
+        <a:xfrm>
+          <a:off x="0" y="0"/>
+          <a:ext cx="0" cy="0"/>
+          <a:chOff x="0" y="0"/>
+          <a:chExt cx="0" cy="0"/>
+        </a:xfrm>
+      </p:grpSpPr>
+      <p:sp>
+        <p:nvSpPr>
+          <p:cNvPr id="2" name="Título 1"/>
+          <p:cNvSpPr>
+            <a:spLocks noGrp="1"/>
+          </p:cNvSpPr>
+          <p:nvPr>
+            <p:ph type="title"/>
+          </p:nvPr>
+        </p:nvSpPr>
+        <p:spPr/>
+        <p:txBody>
+          <a:bodyPr/>
+          <a:lstStyle/>
+          <a:p>
+            <a:r>
+              <a:rPr lang="es-ES" dirty="0"/>
+              <a:t>Nociones de java: </a:t>
+            </a:r>
+            <a:r>
+              <a:rPr lang="es-ES" dirty="0" smtClean="0"/>
+              <a:t> estructuras </a:t>
+            </a:r>
+            <a:r>
+              <a:rPr lang="es-ES" dirty="0" smtClean="0"/>
+              <a:t>de control</a:t>
+            </a:r>
+            <a:endParaRPr lang="es-ES" dirty="0"/>
+          </a:p>
+        </p:txBody>
+      </p:sp>
+      <p:sp>
+        <p:nvSpPr>
+          <p:cNvPr id="4" name="Marcador de contenido 3"/>
+          <p:cNvSpPr>
+            <a:spLocks noGrp="1"/>
+          </p:cNvSpPr>
+          <p:nvPr>
+            <p:ph idx="1"/>
+          </p:nvPr>
+        </p:nvSpPr>
+        <p:spPr/>
+        <p:txBody>
+          <a:bodyPr/>
+          <a:lstStyle/>
+          <a:p>
+            <a:r>
+              <a:rPr lang="es-ES" dirty="0" smtClean="0"/>
+              <a:t>Nos permiten dar unas órdenes y otras dependiendo de los datos que tengamos:</a:t>
+            </a:r>
+          </a:p>
+          <a:p>
+            <a:r>
+              <a:rPr lang="es-ES" dirty="0" err="1" smtClean="0"/>
+              <a:t>if</a:t>
+            </a:r>
+            <a:r>
+              <a:rPr lang="es-ES" dirty="0" smtClean="0"/>
+              <a:t> , </a:t>
+            </a:r>
+            <a:r>
+              <a:rPr lang="es-ES" dirty="0" err="1" smtClean="0"/>
+              <a:t>else</a:t>
+            </a:r>
+            <a:r>
+              <a:rPr lang="es-ES" dirty="0" smtClean="0"/>
+              <a:t>:    </a:t>
+            </a:r>
+            <a:r>
+              <a:rPr lang="es-ES" dirty="0" err="1" smtClean="0"/>
+              <a:t>if</a:t>
+            </a:r>
+            <a:r>
+              <a:rPr lang="es-ES" dirty="0" smtClean="0"/>
+              <a:t> (x&gt;=0) {</a:t>
+            </a:r>
+            <a:r>
+              <a:rPr lang="es-ES" dirty="0" err="1" smtClean="0"/>
+              <a:t>pintaX</a:t>
+            </a:r>
+            <a:r>
+              <a:rPr lang="es-ES" dirty="0" smtClean="0"/>
+              <a:t>(); } </a:t>
+            </a:r>
+            <a:r>
+              <a:rPr lang="es-ES" dirty="0" err="1" smtClean="0"/>
+              <a:t>else</a:t>
+            </a:r>
+            <a:r>
+              <a:rPr lang="es-ES" dirty="0" smtClean="0"/>
+              <a:t> </a:t>
+            </a:r>
+            <a:r>
+              <a:rPr lang="es-ES" dirty="0" err="1" smtClean="0"/>
+              <a:t>pintaY</a:t>
+            </a:r>
+            <a:r>
+              <a:rPr lang="es-ES" dirty="0" smtClean="0"/>
+              <a:t>(); </a:t>
+            </a:r>
+            <a:endParaRPr lang="es-ES" dirty="0"/>
+          </a:p>
+          <a:p>
+            <a:r>
+              <a:rPr lang="es-ES" dirty="0" err="1" smtClean="0"/>
+              <a:t>while</a:t>
+            </a:r>
+            <a:r>
+              <a:rPr lang="es-ES" dirty="0" smtClean="0"/>
+              <a:t> :  </a:t>
+            </a:r>
+            <a:r>
+              <a:rPr lang="es-ES" dirty="0" err="1" smtClean="0"/>
+              <a:t>while</a:t>
+            </a:r>
+            <a:r>
+              <a:rPr lang="es-ES" dirty="0" smtClean="0"/>
+              <a:t> (contador &gt;0) </a:t>
+            </a:r>
+            <a:r>
+              <a:rPr lang="es-ES" dirty="0" err="1" smtClean="0"/>
+              <a:t>pintaX</a:t>
+            </a:r>
+            <a:r>
+              <a:rPr lang="es-ES" dirty="0" smtClean="0"/>
+              <a:t>(); </a:t>
+            </a:r>
+            <a:r>
+              <a:rPr lang="es-ES" dirty="0" err="1" smtClean="0"/>
+              <a:t>else</a:t>
+            </a:r>
+            <a:r>
+              <a:rPr lang="es-ES" dirty="0" smtClean="0"/>
+              <a:t> contador=contador-1;</a:t>
+            </a:r>
+          </a:p>
+          <a:p>
+            <a:r>
+              <a:rPr lang="es-ES" dirty="0" err="1" smtClean="0"/>
+              <a:t>for</a:t>
+            </a:r>
+            <a:r>
+              <a:rPr lang="es-ES" dirty="0" smtClean="0"/>
+              <a:t> : </a:t>
+            </a:r>
+            <a:r>
+              <a:rPr lang="es-ES" dirty="0" err="1" smtClean="0"/>
+              <a:t>for</a:t>
+            </a:r>
+            <a:r>
+              <a:rPr lang="es-ES" dirty="0" smtClean="0"/>
+              <a:t> (</a:t>
+            </a:r>
+            <a:r>
+              <a:rPr lang="es-ES" dirty="0" err="1" smtClean="0"/>
+              <a:t>int</a:t>
+            </a:r>
+            <a:r>
+              <a:rPr lang="es-ES" dirty="0" smtClean="0"/>
+              <a:t> contador =0; contador &lt;100; contador ++) </a:t>
+            </a:r>
+            <a:r>
+              <a:rPr lang="es-ES" dirty="0" err="1" smtClean="0"/>
+              <a:t>pintaX</a:t>
+            </a:r>
+            <a:r>
+              <a:rPr lang="es-ES" dirty="0" smtClean="0"/>
+              <a:t>();</a:t>
+            </a:r>
+          </a:p>
+          <a:p>
+            <a:r>
+              <a:rPr lang="es-ES" dirty="0" err="1" smtClean="0"/>
+              <a:t>switch</a:t>
+            </a:r>
+            <a:r>
+              <a:rPr lang="es-ES" dirty="0" smtClean="0"/>
+              <a:t>…..</a:t>
+            </a:r>
+          </a:p>
+          <a:p>
+            <a:r>
+              <a:rPr lang="es-ES" dirty="0" err="1" smtClean="0"/>
+              <a:t>etc</a:t>
+            </a:r>
+            <a:r>
+              <a:rPr lang="es-ES" dirty="0" smtClean="0"/>
+              <a:t>, </a:t>
+            </a:r>
+            <a:r>
+              <a:rPr lang="es-ES" dirty="0" err="1" smtClean="0"/>
+              <a:t>etc</a:t>
+            </a:r>
+            <a:endParaRPr lang="es-ES" dirty="0" smtClean="0"/>
+          </a:p>
+          <a:p>
+            <a:pPr marL="0" indent="0">
+              <a:buNone/>
+            </a:pPr>
+            <a:endParaRPr lang="es-ES" dirty="0" smtClean="0"/>
+          </a:p>
+        </p:txBody>
+      </p:sp>
+    </p:spTree>
+    <p:extLst>
+      <p:ext uri="{BB962C8B-B14F-4D97-AF65-F5344CB8AC3E}">
+        <p14:creationId xmlns:p14="http://schemas.microsoft.com/office/powerpoint/2010/main" val="689357282"/>
+      </p:ext>
+    </p:extLst>
+  </p:cSld>
+  <p:clrMapOvr>
+    <a:masterClrMapping/>
+  </p:clrMapOvr>
+  <p:timing>
+    <p:tnLst>
+      <p:par>
+        <p:cTn id="1" dur="indefinite" restart="never" nodeType="tmRoot"/>
+      </p:par>
+    </p:tnLst>
+  </p:timing>
+</p:sld>
+</file>
+
+<file path=ppt/slides/slide17.xml><?xml version="1.0" encoding="utf-8"?>
+<p:sld xmlns:a="http://schemas.openxmlformats.org/drawingml/2006/main" xmlns:r="http://schemas.openxmlformats.org/officeDocument/2006/relationships" xmlns:p="http://schemas.openxmlformats.org/presentationml/2006/main">
+  <p:cSld>
+    <p:spTree>
+      <p:nvGrpSpPr>
+        <p:cNvPr id="1" name=""/>
+        <p:cNvGrpSpPr/>
+        <p:nvPr/>
+      </p:nvGrpSpPr>
+      <p:grpSpPr>
+        <a:xfrm>
+          <a:off x="0" y="0"/>
+          <a:ext cx="0" cy="0"/>
+          <a:chOff x="0" y="0"/>
+          <a:chExt cx="0" cy="0"/>
+        </a:xfrm>
+      </p:grpSpPr>
+      <p:sp>
+        <p:nvSpPr>
+          <p:cNvPr id="2" name="Título 1"/>
+          <p:cNvSpPr>
+            <a:spLocks noGrp="1"/>
+          </p:cNvSpPr>
+          <p:nvPr>
+            <p:ph type="title"/>
+          </p:nvPr>
+        </p:nvSpPr>
+        <p:spPr/>
+        <p:txBody>
+          <a:bodyPr/>
+          <a:lstStyle/>
+          <a:p>
+            <a:r>
+              <a:rPr lang="es-ES" dirty="0" smtClean="0"/>
+              <a:t>Menudo lio de lenguajes</a:t>
+            </a:r>
+            <a:endParaRPr lang="es-ES" dirty="0"/>
+          </a:p>
+        </p:txBody>
+      </p:sp>
+      <p:sp>
+        <p:nvSpPr>
+          <p:cNvPr id="5" name="Marcador de contenido 3"/>
+          <p:cNvSpPr>
+            <a:spLocks noGrp="1"/>
+          </p:cNvSpPr>
+          <p:nvPr>
+            <p:ph idx="1"/>
+          </p:nvPr>
+        </p:nvSpPr>
+        <p:spPr>
+          <a:xfrm>
+            <a:off x="581192" y="2337847"/>
+            <a:ext cx="8126913" cy="3386371"/>
+          </a:xfrm>
+        </p:spPr>
+        <p:txBody>
+          <a:bodyPr anchor="t">
+            <a:normAutofit lnSpcReduction="10000"/>
+          </a:bodyPr>
+          <a:lstStyle/>
+          <a:p>
+            <a:r>
+              <a:rPr lang="es-ES" dirty="0" smtClean="0"/>
+              <a:t>Todos los lenguajes modernos tienen librerías de funciones que permiten reusar código hecho por otros programadores. </a:t>
+            </a:r>
+          </a:p>
+          <a:p>
+            <a:r>
+              <a:rPr lang="es-ES" dirty="0" smtClean="0"/>
+              <a:t>El </a:t>
+            </a:r>
+            <a:r>
+              <a:rPr lang="es-ES" dirty="0"/>
+              <a:t>lenguaje de </a:t>
+            </a:r>
+            <a:r>
+              <a:rPr lang="es-ES" dirty="0" smtClean="0"/>
+              <a:t>Processing </a:t>
+            </a:r>
+            <a:r>
+              <a:rPr lang="es-ES" dirty="0"/>
+              <a:t>es Java. </a:t>
+            </a:r>
+          </a:p>
+          <a:p>
+            <a:r>
+              <a:rPr lang="es-ES" dirty="0" smtClean="0"/>
+              <a:t>Processing no es más que una </a:t>
+            </a:r>
+            <a:r>
+              <a:rPr lang="es-ES" b="1" dirty="0" smtClean="0"/>
+              <a:t>librería</a:t>
+            </a:r>
+            <a:r>
+              <a:rPr lang="es-ES" dirty="0" smtClean="0"/>
+              <a:t> de Java, que se puede ejecutar en un IDE simplificado aunque también se puede ejecutar en un IDE profesional (</a:t>
+            </a:r>
+            <a:r>
+              <a:rPr lang="es-ES" dirty="0" err="1" smtClean="0"/>
+              <a:t>NetBeans</a:t>
+            </a:r>
+            <a:r>
+              <a:rPr lang="es-ES" dirty="0" smtClean="0"/>
+              <a:t>, Eclipse, etc.) </a:t>
+            </a:r>
+          </a:p>
+          <a:p>
+            <a:r>
+              <a:rPr lang="es-ES" dirty="0" smtClean="0"/>
+              <a:t>JavaScript </a:t>
+            </a:r>
+            <a:r>
+              <a:rPr lang="es-ES" dirty="0" smtClean="0"/>
+              <a:t>no tiene nada que ver con Java (le han puesto ese nombre por marketing). </a:t>
+            </a:r>
+          </a:p>
+          <a:p>
+            <a:r>
+              <a:rPr lang="es-ES" dirty="0" smtClean="0"/>
+              <a:t>Processing se puede ejecutar </a:t>
+            </a:r>
+            <a:r>
+              <a:rPr lang="es-ES" dirty="0" smtClean="0"/>
+              <a:t>en </a:t>
+            </a:r>
+            <a:r>
+              <a:rPr lang="es-ES" dirty="0" smtClean="0"/>
+              <a:t>una página web usando un </a:t>
+            </a:r>
+            <a:r>
+              <a:rPr lang="es-ES" dirty="0" smtClean="0"/>
+              <a:t>desde </a:t>
+            </a:r>
+            <a:r>
+              <a:rPr lang="es-ES" dirty="0" smtClean="0"/>
+              <a:t>JavaScript. </a:t>
+            </a:r>
+            <a:r>
+              <a:rPr lang="es-ES" dirty="0" smtClean="0"/>
+              <a:t> </a:t>
+            </a:r>
+            <a:r>
+              <a:rPr lang="es-ES" dirty="0" smtClean="0"/>
+              <a:t>Esto se hace con ProcessingJS. </a:t>
+            </a:r>
+            <a:endParaRPr lang="es-ES" dirty="0" smtClean="0"/>
+          </a:p>
+          <a:p>
+            <a:endParaRPr lang="es-ES" dirty="0"/>
+          </a:p>
+        </p:txBody>
+      </p:sp>
+      <p:pic>
+        <p:nvPicPr>
+          <p:cNvPr id="8200" name="Picture 8" descr="http://www.simalgrat.com/wp-content/uploads/2014/01/java-logo.png"/>
+          <p:cNvPicPr>
+            <a:picLocks noChangeAspect="1" noChangeArrowheads="1"/>
+          </p:cNvPicPr>
+          <p:nvPr/>
+        </p:nvPicPr>
+        <p:blipFill>
+          <a:blip r:embed="rId2">
+            <a:extLst>
+              <a:ext uri="{28A0092B-C50C-407E-A947-70E740481C1C}">
+                <a14:useLocalDpi xmlns:a14="http://schemas.microsoft.com/office/drawing/2010/main" val="0"/>
+              </a:ext>
+            </a:extLst>
+          </a:blip>
+          <a:srcRect/>
+          <a:stretch>
+            <a:fillRect/>
+          </a:stretch>
+        </p:blipFill>
+        <p:spPr bwMode="auto">
+          <a:xfrm>
+            <a:off x="581192" y="5152548"/>
+            <a:ext cx="1557479" cy="1557479"/>
+          </a:xfrm>
+          <a:prstGeom prst="rect">
+            <a:avLst/>
+          </a:prstGeom>
+          <a:noFill/>
+          <a:extLst>
+            <a:ext uri="{909E8E84-426E-40DD-AFC4-6F175D3DCCD1}">
+              <a14:hiddenFill xmlns:a14="http://schemas.microsoft.com/office/drawing/2010/main">
+                <a:solidFill>
+                  <a:srgbClr val="FFFFFF"/>
+                </a:solidFill>
+              </a14:hiddenFill>
+            </a:ext>
+          </a:extLst>
+        </p:spPr>
+      </p:pic>
+      <p:pic>
+        <p:nvPicPr>
+          <p:cNvPr id="8208" name="Picture 16" descr="http://www.adafruit.com/blog/wp-content/uploads/2012/09/256px-Processing_Logo_Clipped.svg_.jpg"/>
+          <p:cNvPicPr>
+            <a:picLocks noChangeAspect="1" noChangeArrowheads="1"/>
+          </p:cNvPicPr>
+          <p:nvPr/>
+        </p:nvPicPr>
+        <p:blipFill>
+          <a:blip r:embed="rId3">
+            <a:extLst>
+              <a:ext uri="{28A0092B-C50C-407E-A947-70E740481C1C}">
+                <a14:useLocalDpi xmlns:a14="http://schemas.microsoft.com/office/drawing/2010/main" val="0"/>
+              </a:ext>
+            </a:extLst>
+          </a:blip>
+          <a:srcRect/>
+          <a:stretch>
+            <a:fillRect/>
+          </a:stretch>
+        </p:blipFill>
+        <p:spPr bwMode="auto">
+          <a:xfrm>
+            <a:off x="2549337" y="5409483"/>
+            <a:ext cx="1059767" cy="1059767"/>
+          </a:xfrm>
+          <a:prstGeom prst="rect">
+            <a:avLst/>
+          </a:prstGeom>
+          <a:noFill/>
+          <a:extLst>
+            <a:ext uri="{909E8E84-426E-40DD-AFC4-6F175D3DCCD1}">
+              <a14:hiddenFill xmlns:a14="http://schemas.microsoft.com/office/drawing/2010/main">
+                <a:solidFill>
+                  <a:srgbClr val="FFFFFF"/>
+                </a:solidFill>
+              </a14:hiddenFill>
+            </a:ext>
+          </a:extLst>
+        </p:spPr>
+      </p:pic>
+      <p:pic>
+        <p:nvPicPr>
+          <p:cNvPr id="3" name="Imagen 2"/>
+          <p:cNvPicPr>
+            <a:picLocks noChangeAspect="1"/>
+          </p:cNvPicPr>
+          <p:nvPr/>
+        </p:nvPicPr>
+        <p:blipFill>
+          <a:blip r:embed="rId4"/>
+          <a:stretch>
+            <a:fillRect/>
+          </a:stretch>
+        </p:blipFill>
+        <p:spPr>
+          <a:xfrm>
+            <a:off x="6175499" y="5541417"/>
+            <a:ext cx="897667" cy="908681"/>
+          </a:xfrm>
+          <a:prstGeom prst="rect">
+            <a:avLst/>
+          </a:prstGeom>
+        </p:spPr>
+      </p:pic>
+      <p:pic>
+        <p:nvPicPr>
+          <p:cNvPr id="4" name="Imagen 3"/>
+          <p:cNvPicPr>
+            <a:picLocks noChangeAspect="1"/>
+          </p:cNvPicPr>
+          <p:nvPr/>
+        </p:nvPicPr>
+        <p:blipFill>
+          <a:blip r:embed="rId5"/>
+          <a:stretch>
+            <a:fillRect/>
+          </a:stretch>
+        </p:blipFill>
+        <p:spPr>
+          <a:xfrm>
+            <a:off x="4576068" y="5512855"/>
+            <a:ext cx="924844" cy="924844"/>
+          </a:xfrm>
+          <a:prstGeom prst="rect">
+            <a:avLst/>
+          </a:prstGeom>
+        </p:spPr>
+      </p:pic>
+      <p:pic>
+        <p:nvPicPr>
+          <p:cNvPr id="7" name="Imagen 6"/>
+          <p:cNvPicPr>
+            <a:picLocks noChangeAspect="1"/>
+          </p:cNvPicPr>
+          <p:nvPr/>
+        </p:nvPicPr>
+        <p:blipFill>
+          <a:blip r:embed="rId6">
+            <a:clrChange>
+              <a:clrFrom>
+                <a:srgbClr val="000000"/>
+              </a:clrFrom>
+              <a:clrTo>
+                <a:srgbClr val="000000">
+                  <a:alpha val="0"/>
+                </a:srgbClr>
+              </a:clrTo>
+            </a:clrChange>
+          </a:blip>
+          <a:stretch>
+            <a:fillRect/>
+          </a:stretch>
+        </p:blipFill>
+        <p:spPr>
+          <a:xfrm>
+            <a:off x="7747754" y="5450641"/>
+            <a:ext cx="1049272" cy="1049272"/>
+          </a:xfrm>
+          <a:prstGeom prst="rect">
+            <a:avLst/>
+          </a:prstGeom>
+        </p:spPr>
+      </p:pic>
+    </p:spTree>
+    <p:extLst>
+      <p:ext uri="{BB962C8B-B14F-4D97-AF65-F5344CB8AC3E}">
+        <p14:creationId xmlns:p14="http://schemas.microsoft.com/office/powerpoint/2010/main" val="2054407964"/>
       </p:ext>
     </p:extLst>
   </p:cSld>
@@ -5101,307 +6802,152 @@
           <a:p>
             <a:r>
               <a:rPr lang="es-ES" dirty="0" smtClean="0"/>
-              <a:t>Menudo lio de lenguajes</a:t>
-            </a:r>
-            <a:endParaRPr lang="es-ES" dirty="0"/>
-          </a:p>
-        </p:txBody>
-      </p:sp>
-      <p:sp>
-        <p:nvSpPr>
-          <p:cNvPr id="5" name="Marcador de contenido 3"/>
-          <p:cNvSpPr>
-            <a:spLocks noGrp="1"/>
-          </p:cNvSpPr>
-          <p:nvPr>
-            <p:ph idx="1"/>
-          </p:nvPr>
-        </p:nvSpPr>
-        <p:spPr>
-          <a:xfrm>
-            <a:off x="581192" y="2337847"/>
-            <a:ext cx="8126913" cy="3386371"/>
-          </a:xfrm>
-        </p:spPr>
-        <p:txBody>
-          <a:bodyPr anchor="t">
-            <a:normAutofit fontScale="92500" lnSpcReduction="20000"/>
-          </a:bodyPr>
-          <a:lstStyle/>
-          <a:p>
-            <a:r>
-              <a:rPr lang="es-ES" dirty="0" smtClean="0"/>
-              <a:t>Todos los lenguajes modernos tienen librerías de funciones que permiten reusar código hecho por otros programadores. </a:t>
-            </a:r>
-          </a:p>
-          <a:p>
-            <a:r>
-              <a:rPr lang="es-ES" dirty="0" smtClean="0"/>
-              <a:t>El </a:t>
-            </a:r>
-            <a:r>
-              <a:rPr lang="es-ES" dirty="0"/>
-              <a:t>lenguaje de </a:t>
-            </a:r>
-            <a:r>
-              <a:rPr lang="es-ES" dirty="0" smtClean="0"/>
-              <a:t>Processing </a:t>
-            </a:r>
-            <a:r>
-              <a:rPr lang="es-ES" dirty="0"/>
-              <a:t>es Java. </a:t>
-            </a:r>
-          </a:p>
-          <a:p>
-            <a:r>
-              <a:rPr lang="es-ES" dirty="0" smtClean="0"/>
-              <a:t>Processing no es más que una </a:t>
-            </a:r>
-            <a:r>
-              <a:rPr lang="es-ES" b="1" dirty="0" smtClean="0"/>
-              <a:t>librería</a:t>
-            </a:r>
-            <a:r>
-              <a:rPr lang="es-ES" dirty="0" smtClean="0"/>
-              <a:t> de Java, que se puede ejecutar en un IDE simplificado aunque también se puede ejecutar en un IDE profesional (</a:t>
+              <a:t>Artistas que usan </a:t>
             </a:r>
             <a:r>
               <a:rPr lang="es-ES" dirty="0" err="1" smtClean="0"/>
-              <a:t>NetBeans</a:t>
-            </a:r>
-            <a:r>
-              <a:rPr lang="es-ES" dirty="0" smtClean="0"/>
-              <a:t>, Eclipse, etc.) </a:t>
-            </a:r>
-          </a:p>
-          <a:p>
-            <a:r>
-              <a:rPr lang="es-ES" dirty="0" smtClean="0"/>
-              <a:t>Arduino se programa en </a:t>
-            </a:r>
-            <a:r>
-              <a:rPr lang="es-ES" dirty="0" err="1" smtClean="0"/>
-              <a:t>Wiring</a:t>
-            </a:r>
-            <a:r>
-              <a:rPr lang="es-ES" dirty="0" smtClean="0"/>
-              <a:t>, una variante de C++, que es también orientada a objetos, y usa el IDE de </a:t>
-            </a:r>
-            <a:r>
-              <a:rPr lang="es-ES" dirty="0"/>
-              <a:t>P</a:t>
-            </a:r>
-            <a:r>
-              <a:rPr lang="es-ES" dirty="0" smtClean="0"/>
-              <a:t>rocessing (también puede usar </a:t>
-            </a:r>
-            <a:r>
-              <a:rPr lang="es-ES" dirty="0" err="1" smtClean="0"/>
-              <a:t>IDEs</a:t>
-            </a:r>
-            <a:r>
-              <a:rPr lang="es-ES" dirty="0" smtClean="0"/>
-              <a:t> profesionales de C++: Visual C++ y otros). </a:t>
-            </a:r>
-          </a:p>
-          <a:p>
-            <a:r>
-              <a:rPr lang="es-ES" dirty="0" smtClean="0"/>
-              <a:t>JavaScript no tiene nada que ver con Java (le han puesto ese nombre por marketing). </a:t>
-            </a:r>
-          </a:p>
-          <a:p>
-            <a:r>
-              <a:rPr lang="es-ES" dirty="0" smtClean="0"/>
-              <a:t>Processing se puede ejecutar desde JavaScript. </a:t>
-            </a:r>
-          </a:p>
-          <a:p>
+              <a:t>processing</a:t>
+            </a:r>
             <a:endParaRPr lang="es-ES" dirty="0"/>
           </a:p>
         </p:txBody>
       </p:sp>
       <p:pic>
         <p:nvPicPr>
-          <p:cNvPr id="8198" name="Picture 6" descr="http://a607.phobos.apple.com/us/r30/Purple/v4/e2/72/45/e272451a-3b44-e482-dc63-43486edc7ed7/mzl.mbiqiwue.png"/>
+          <p:cNvPr id="4" name="Imagen 3"/>
           <p:cNvPicPr>
-            <a:picLocks noChangeAspect="1" noChangeArrowheads="1"/>
+            <a:picLocks noChangeAspect="1"/>
           </p:cNvPicPr>
           <p:nvPr/>
         </p:nvPicPr>
         <p:blipFill>
-          <a:blip r:embed="rId2">
-            <a:extLst>
-              <a:ext uri="{28A0092B-C50C-407E-A947-70E740481C1C}">
-                <a14:useLocalDpi xmlns:a14="http://schemas.microsoft.com/office/drawing/2010/main" val="0"/>
-              </a:ext>
-            </a:extLst>
-          </a:blip>
-          <a:srcRect/>
+          <a:blip r:embed="rId2"/>
           <a:stretch>
             <a:fillRect/>
           </a:stretch>
         </p:blipFill>
-        <p:spPr bwMode="auto">
+        <p:spPr>
           <a:xfrm>
-            <a:off x="1012101" y="5705632"/>
-            <a:ext cx="990319" cy="990319"/>
+            <a:off x="469557" y="1972190"/>
+            <a:ext cx="8194216" cy="4626318"/>
           </a:xfrm>
           <a:prstGeom prst="rect">
             <a:avLst/>
           </a:prstGeom>
-          <a:noFill/>
-          <a:extLst>
-            <a:ext uri="{909E8E84-426E-40DD-AFC4-6F175D3DCCD1}">
-              <a14:hiddenFill xmlns:a14="http://schemas.microsoft.com/office/drawing/2010/main">
-                <a:solidFill>
-                  <a:srgbClr val="FFFFFF"/>
-                </a:solidFill>
-              </a14:hiddenFill>
-            </a:ext>
-          </a:extLst>
         </p:spPr>
       </p:pic>
-      <p:pic>
-        <p:nvPicPr>
-          <p:cNvPr id="8200" name="Picture 8" descr="http://www.simalgrat.com/wp-content/uploads/2014/01/java-logo.png"/>
-          <p:cNvPicPr>
-            <a:picLocks noChangeAspect="1" noChangeArrowheads="1"/>
-          </p:cNvPicPr>
+      <p:sp>
+        <p:nvSpPr>
+          <p:cNvPr id="5" name="Título 1"/>
+          <p:cNvSpPr txBox="1">
+            <a:spLocks/>
+          </p:cNvSpPr>
           <p:nvPr/>
-        </p:nvPicPr>
-        <p:blipFill>
-          <a:blip r:embed="rId3">
-            <a:extLst>
-              <a:ext uri="{28A0092B-C50C-407E-A947-70E740481C1C}">
-                <a14:useLocalDpi xmlns:a14="http://schemas.microsoft.com/office/drawing/2010/main" val="0"/>
-              </a:ext>
-            </a:extLst>
-          </a:blip>
-          <a:srcRect/>
-          <a:stretch>
-            <a:fillRect/>
-          </a:stretch>
-        </p:blipFill>
-        <p:spPr bwMode="auto">
+        </p:nvSpPr>
+        <p:spPr>
           <a:xfrm>
-            <a:off x="2002420" y="5288947"/>
-            <a:ext cx="1557479" cy="1557479"/>
+            <a:off x="5355019" y="2113005"/>
+            <a:ext cx="3084646" cy="502176"/>
           </a:xfrm>
           <a:prstGeom prst="rect">
             <a:avLst/>
           </a:prstGeom>
-          <a:noFill/>
-          <a:extLst>
-            <a:ext uri="{909E8E84-426E-40DD-AFC4-6F175D3DCCD1}">
-              <a14:hiddenFill xmlns:a14="http://schemas.microsoft.com/office/drawing/2010/main">
-                <a:solidFill>
-                  <a:srgbClr val="FFFFFF"/>
-                </a:solidFill>
-              </a14:hiddenFill>
-            </a:ext>
-          </a:extLst>
         </p:spPr>
-      </p:pic>
-      <p:pic>
-        <p:nvPicPr>
-          <p:cNvPr id="8204" name="Picture 12" descr="http://burutek.org/wp-content/uploads/2014/04/logo1.jpg"/>
-          <p:cNvPicPr>
-            <a:picLocks noChangeAspect="1" noChangeArrowheads="1"/>
-          </p:cNvPicPr>
-          <p:nvPr/>
-        </p:nvPicPr>
-        <p:blipFill>
-          <a:blip r:embed="rId4">
-            <a:extLst>
-              <a:ext uri="{28A0092B-C50C-407E-A947-70E740481C1C}">
-                <a14:useLocalDpi xmlns:a14="http://schemas.microsoft.com/office/drawing/2010/main" val="0"/>
-              </a:ext>
-            </a:extLst>
-          </a:blip>
-          <a:srcRect/>
-          <a:stretch>
-            <a:fillRect/>
-          </a:stretch>
-        </p:blipFill>
-        <p:spPr bwMode="auto">
-          <a:xfrm>
-            <a:off x="3674276" y="5675400"/>
-            <a:ext cx="1441731" cy="1020551"/>
-          </a:xfrm>
-          <a:prstGeom prst="rect">
-            <a:avLst/>
-          </a:prstGeom>
-          <a:noFill/>
-          <a:extLst>
-            <a:ext uri="{909E8E84-426E-40DD-AFC4-6F175D3DCCD1}">
-              <a14:hiddenFill xmlns:a14="http://schemas.microsoft.com/office/drawing/2010/main">
-                <a:solidFill>
-                  <a:srgbClr val="FFFFFF"/>
-                </a:solidFill>
-              </a14:hiddenFill>
-            </a:ext>
-          </a:extLst>
-        </p:spPr>
-      </p:pic>
-      <p:pic>
-        <p:nvPicPr>
-          <p:cNvPr id="8208" name="Picture 16" descr="http://www.adafruit.com/blog/wp-content/uploads/2012/09/256px-Processing_Logo_Clipped.svg_.jpg"/>
-          <p:cNvPicPr>
-            <a:picLocks noChangeAspect="1" noChangeArrowheads="1"/>
-          </p:cNvPicPr>
-          <p:nvPr/>
-        </p:nvPicPr>
-        <p:blipFill>
-          <a:blip r:embed="rId5">
-            <a:extLst>
-              <a:ext uri="{28A0092B-C50C-407E-A947-70E740481C1C}">
-                <a14:useLocalDpi xmlns:a14="http://schemas.microsoft.com/office/drawing/2010/main" val="0"/>
-              </a:ext>
-            </a:extLst>
-          </a:blip>
-          <a:srcRect/>
-          <a:stretch>
-            <a:fillRect/>
-          </a:stretch>
-        </p:blipFill>
-        <p:spPr bwMode="auto">
-          <a:xfrm>
-            <a:off x="5618244" y="5636184"/>
-            <a:ext cx="1059767" cy="1059767"/>
-          </a:xfrm>
-          <a:prstGeom prst="rect">
-            <a:avLst/>
-          </a:prstGeom>
-          <a:noFill/>
-          <a:extLst>
-            <a:ext uri="{909E8E84-426E-40DD-AFC4-6F175D3DCCD1}">
-              <a14:hiddenFill xmlns:a14="http://schemas.microsoft.com/office/drawing/2010/main">
-                <a:solidFill>
-                  <a:srgbClr val="FFFFFF"/>
-                </a:solidFill>
-              </a14:hiddenFill>
-            </a:ext>
-          </a:extLst>
-        </p:spPr>
-      </p:pic>
+        <p:txBody>
+          <a:bodyPr vert="horz" lIns="91440" tIns="45720" rIns="91440" bIns="45720" rtlCol="0" anchor="b">
+            <a:normAutofit fontScale="92500"/>
+          </a:bodyPr>
+          <a:lstStyle>
+            <a:lvl1pPr algn="l" defTabSz="457200" rtl="0" eaLnBrk="1" latinLnBrk="0" hangingPunct="1">
+              <a:spcBef>
+                <a:spcPct val="0"/>
+              </a:spcBef>
+              <a:buNone/>
+              <a:defRPr sz="2800" b="0" kern="1200" cap="all">
+                <a:solidFill>
+                  <a:schemeClr val="bg1"/>
+                </a:solidFill>
+                <a:latin typeface="+mj-lt"/>
+                <a:ea typeface="+mj-ea"/>
+                <a:cs typeface="+mj-cs"/>
+              </a:defRPr>
+            </a:lvl1pPr>
+            <a:lvl2pPr eaLnBrk="1" hangingPunct="1">
+              <a:defRPr>
+                <a:solidFill>
+                  <a:schemeClr val="tx2"/>
+                </a:solidFill>
+              </a:defRPr>
+            </a:lvl2pPr>
+            <a:lvl3pPr eaLnBrk="1" hangingPunct="1">
+              <a:defRPr>
+                <a:solidFill>
+                  <a:schemeClr val="tx2"/>
+                </a:solidFill>
+              </a:defRPr>
+            </a:lvl3pPr>
+            <a:lvl4pPr eaLnBrk="1" hangingPunct="1">
+              <a:defRPr>
+                <a:solidFill>
+                  <a:schemeClr val="tx2"/>
+                </a:solidFill>
+              </a:defRPr>
+            </a:lvl4pPr>
+            <a:lvl5pPr eaLnBrk="1" hangingPunct="1">
+              <a:defRPr>
+                <a:solidFill>
+                  <a:schemeClr val="tx2"/>
+                </a:solidFill>
+              </a:defRPr>
+            </a:lvl5pPr>
+            <a:lvl6pPr eaLnBrk="1" hangingPunct="1">
+              <a:defRPr>
+                <a:solidFill>
+                  <a:schemeClr val="tx2"/>
+                </a:solidFill>
+              </a:defRPr>
+            </a:lvl6pPr>
+            <a:lvl7pPr eaLnBrk="1" hangingPunct="1">
+              <a:defRPr>
+                <a:solidFill>
+                  <a:schemeClr val="tx2"/>
+                </a:solidFill>
+              </a:defRPr>
+            </a:lvl7pPr>
+            <a:lvl8pPr eaLnBrk="1" hangingPunct="1">
+              <a:defRPr>
+                <a:solidFill>
+                  <a:schemeClr val="tx2"/>
+                </a:solidFill>
+              </a:defRPr>
+            </a:lvl8pPr>
+            <a:lvl9pPr eaLnBrk="1" hangingPunct="1">
+              <a:defRPr>
+                <a:solidFill>
+                  <a:schemeClr val="tx2"/>
+                </a:solidFill>
+              </a:defRPr>
+            </a:lvl9pPr>
+          </a:lstStyle>
+          <a:p>
+            <a:r>
+              <a:rPr lang="es-ES" dirty="0" smtClean="0"/>
+              <a:t>Alba G. corral</a:t>
+            </a:r>
+            <a:endParaRPr lang="es-ES" dirty="0"/>
+          </a:p>
+        </p:txBody>
+      </p:sp>
     </p:spTree>
     <p:extLst>
       <p:ext uri="{BB962C8B-B14F-4D97-AF65-F5344CB8AC3E}">
-        <p14:creationId xmlns:p14="http://schemas.microsoft.com/office/powerpoint/2010/main" val="2054407964"/>
+        <p14:creationId xmlns:p14="http://schemas.microsoft.com/office/powerpoint/2010/main" val="2080994803"/>
       </p:ext>
     </p:extLst>
   </p:cSld>
   <p:clrMapOvr>
     <a:masterClrMapping/>
   </p:clrMapOvr>
-  <p:timing>
-    <p:tnLst>
-      <p:par>
-        <p:cTn id="1" dur="indefinite" restart="never" nodeType="tmRoot"/>
-      </p:par>
-    </p:tnLst>
-  </p:timing>
 </p:sld>
 </file>
 
@@ -5422,6 +6968,30 @@
           <a:chExt cx="0" cy="0"/>
         </a:xfrm>
       </p:grpSpPr>
+      <p:pic>
+        <p:nvPicPr>
+          <p:cNvPr id="3" name="Imagen 2"/>
+          <p:cNvPicPr>
+            <a:picLocks noChangeAspect="1"/>
+          </p:cNvPicPr>
+          <p:nvPr/>
+        </p:nvPicPr>
+        <p:blipFill>
+          <a:blip r:embed="rId2"/>
+          <a:stretch>
+            <a:fillRect/>
+          </a:stretch>
+        </p:blipFill>
+        <p:spPr>
+          <a:xfrm>
+            <a:off x="457200" y="1952367"/>
+            <a:ext cx="8241956" cy="4661653"/>
+          </a:xfrm>
+          <a:prstGeom prst="rect">
+            <a:avLst/>
+          </a:prstGeom>
+        </p:spPr>
+      </p:pic>
       <p:sp>
         <p:nvSpPr>
           <p:cNvPr id="2" name="Título 1"/>
@@ -5439,7 +7009,11 @@
           <a:p>
             <a:r>
               <a:rPr lang="es-ES" dirty="0" smtClean="0"/>
-              <a:t>TERMINOLOGÍA: TIPOS DE DATOS, FUNCIONES, CLASES Y OBJETOS</a:t>
+              <a:t>Artistas que usan </a:t>
+            </a:r>
+            <a:r>
+              <a:rPr lang="es-ES" dirty="0" err="1" smtClean="0"/>
+              <a:t>processing</a:t>
             </a:r>
             <a:endParaRPr lang="es-ES" dirty="0"/>
           </a:p>
@@ -5447,89 +7021,116 @@
       </p:sp>
       <p:sp>
         <p:nvSpPr>
-          <p:cNvPr id="5" name="Marcador de contenido 3"/>
-          <p:cNvSpPr>
-            <a:spLocks noGrp="1"/>
-          </p:cNvSpPr>
-          <p:nvPr>
-            <p:ph idx="1"/>
-          </p:nvPr>
+          <p:cNvPr id="5" name="Título 1"/>
+          <p:cNvSpPr txBox="1">
+            <a:spLocks/>
+          </p:cNvSpPr>
+          <p:nvPr/>
         </p:nvSpPr>
         <p:spPr>
           <a:xfrm>
-            <a:off x="486138" y="2337847"/>
-            <a:ext cx="8221968" cy="3386371"/>
+            <a:off x="5355019" y="2113005"/>
+            <a:ext cx="3084646" cy="502176"/>
           </a:xfrm>
+          <a:prstGeom prst="rect">
+            <a:avLst/>
+          </a:prstGeom>
         </p:spPr>
         <p:txBody>
-          <a:bodyPr anchor="t">
+          <a:bodyPr vert="horz" lIns="91440" tIns="45720" rIns="91440" bIns="45720" rtlCol="0" anchor="b">
             <a:normAutofit lnSpcReduction="10000"/>
           </a:bodyPr>
-          <a:lstStyle/>
-          <a:p>
-            <a:r>
-              <a:rPr lang="es-ES" dirty="0" smtClean="0"/>
-              <a:t>Todos los lenguajes manejan datos que almacenan en memoria dinámica. Los datos pueden ser de distintos </a:t>
-            </a:r>
-            <a:r>
-              <a:rPr lang="es-ES" b="1" u="sng" dirty="0" smtClean="0"/>
-              <a:t>tipos</a:t>
-            </a:r>
-            <a:r>
-              <a:rPr lang="es-ES" dirty="0" smtClean="0"/>
-              <a:t> y es algo fundamental en todos los lenguajes de programación manejar distintos tipos de datos.</a:t>
-            </a:r>
-          </a:p>
-          <a:p>
-            <a:r>
-              <a:rPr lang="es-ES" dirty="0" smtClean="0"/>
-              <a:t>Los programas no son mas que conjuntos de órdenes para procesar distintos tipos de datos de diversas formas.  </a:t>
-            </a:r>
-          </a:p>
-          <a:p>
-            <a:r>
-              <a:rPr lang="es-ES" dirty="0" smtClean="0"/>
-              <a:t>Cuando un conjunto de ordenes la vamos a repetir varias veces, hacemos una función para no tener que escribirla una y otra vez. </a:t>
-            </a:r>
-          </a:p>
-          <a:p>
-            <a:r>
-              <a:rPr lang="es-ES" dirty="0" smtClean="0"/>
-              <a:t>Los lenguajes orientados a </a:t>
-            </a:r>
-            <a:r>
-              <a:rPr lang="es-ES" b="1" dirty="0" smtClean="0"/>
-              <a:t>objetos</a:t>
-            </a:r>
-            <a:r>
-              <a:rPr lang="es-ES" dirty="0" smtClean="0"/>
-              <a:t>, encapsulan las estructuras de datos junto a las funciones que los manejan en estructuras denominadas </a:t>
-            </a:r>
-            <a:r>
-              <a:rPr lang="es-ES" b="1" dirty="0" smtClean="0"/>
-              <a:t>clases</a:t>
-            </a:r>
-            <a:endParaRPr lang="es-ES" b="1" dirty="0"/>
+          <a:lstStyle>
+            <a:lvl1pPr algn="l" defTabSz="457200" rtl="0" eaLnBrk="1" latinLnBrk="0" hangingPunct="1">
+              <a:spcBef>
+                <a:spcPct val="0"/>
+              </a:spcBef>
+              <a:buNone/>
+              <a:defRPr sz="2800" b="0" kern="1200" cap="all">
+                <a:solidFill>
+                  <a:schemeClr val="bg1"/>
+                </a:solidFill>
+                <a:latin typeface="+mj-lt"/>
+                <a:ea typeface="+mj-ea"/>
+                <a:cs typeface="+mj-cs"/>
+              </a:defRPr>
+            </a:lvl1pPr>
+            <a:lvl2pPr eaLnBrk="1" hangingPunct="1">
+              <a:defRPr>
+                <a:solidFill>
+                  <a:schemeClr val="tx2"/>
+                </a:solidFill>
+              </a:defRPr>
+            </a:lvl2pPr>
+            <a:lvl3pPr eaLnBrk="1" hangingPunct="1">
+              <a:defRPr>
+                <a:solidFill>
+                  <a:schemeClr val="tx2"/>
+                </a:solidFill>
+              </a:defRPr>
+            </a:lvl3pPr>
+            <a:lvl4pPr eaLnBrk="1" hangingPunct="1">
+              <a:defRPr>
+                <a:solidFill>
+                  <a:schemeClr val="tx2"/>
+                </a:solidFill>
+              </a:defRPr>
+            </a:lvl4pPr>
+            <a:lvl5pPr eaLnBrk="1" hangingPunct="1">
+              <a:defRPr>
+                <a:solidFill>
+                  <a:schemeClr val="tx2"/>
+                </a:solidFill>
+              </a:defRPr>
+            </a:lvl5pPr>
+            <a:lvl6pPr eaLnBrk="1" hangingPunct="1">
+              <a:defRPr>
+                <a:solidFill>
+                  <a:schemeClr val="tx2"/>
+                </a:solidFill>
+              </a:defRPr>
+            </a:lvl6pPr>
+            <a:lvl7pPr eaLnBrk="1" hangingPunct="1">
+              <a:defRPr>
+                <a:solidFill>
+                  <a:schemeClr val="tx2"/>
+                </a:solidFill>
+              </a:defRPr>
+            </a:lvl7pPr>
+            <a:lvl8pPr eaLnBrk="1" hangingPunct="1">
+              <a:defRPr>
+                <a:solidFill>
+                  <a:schemeClr val="tx2"/>
+                </a:solidFill>
+              </a:defRPr>
+            </a:lvl8pPr>
+            <a:lvl9pPr eaLnBrk="1" hangingPunct="1">
+              <a:defRPr>
+                <a:solidFill>
+                  <a:schemeClr val="tx2"/>
+                </a:solidFill>
+              </a:defRPr>
+            </a:lvl9pPr>
+          </a:lstStyle>
+          <a:p>
+            <a:r>
+              <a:rPr lang="es-ES" dirty="0" smtClean="0"/>
+              <a:t>Marta verde</a:t>
+            </a:r>
+            <a:endParaRPr lang="es-ES" dirty="0"/>
           </a:p>
         </p:txBody>
       </p:sp>
     </p:spTree>
     <p:extLst>
       <p:ext uri="{BB962C8B-B14F-4D97-AF65-F5344CB8AC3E}">
-        <p14:creationId xmlns:p14="http://schemas.microsoft.com/office/powerpoint/2010/main" val="1419523615"/>
+        <p14:creationId xmlns:p14="http://schemas.microsoft.com/office/powerpoint/2010/main" val="3523668498"/>
       </p:ext>
     </p:extLst>
   </p:cSld>
   <p:clrMapOvr>
     <a:masterClrMapping/>
   </p:clrMapOvr>
-  <p:timing>
-    <p:tnLst>
-      <p:par>
-        <p:cTn id="1" dur="indefinite" restart="never" nodeType="tmRoot"/>
-      </p:par>
-    </p:tnLst>
-  </p:timing>
 </p:sld>
 </file>
 
@@ -5566,183 +7167,157 @@
           <a:lstStyle/>
           <a:p>
             <a:r>
-              <a:rPr lang="es-ES" dirty="0" smtClean="0"/>
-              <a:t>ANATOMIA DE UNA APLICACIÓN PROCESSING</a:t>
+              <a:rPr lang="es-ES" dirty="0"/>
+              <a:t>Artistas que usan </a:t>
+            </a:r>
+            <a:r>
+              <a:rPr lang="es-ES" dirty="0" err="1"/>
+              <a:t>processing</a:t>
             </a:r>
             <a:endParaRPr lang="es-ES" dirty="0"/>
           </a:p>
         </p:txBody>
       </p:sp>
-      <p:sp>
-        <p:nvSpPr>
-          <p:cNvPr id="5" name="Marcador de contenido 3"/>
-          <p:cNvSpPr>
-            <a:spLocks noGrp="1"/>
-          </p:cNvSpPr>
-          <p:nvPr>
-            <p:ph idx="1"/>
-          </p:nvPr>
-        </p:nvSpPr>
+      <p:pic>
+        <p:nvPicPr>
+          <p:cNvPr id="5" name="Imagen 4"/>
+          <p:cNvPicPr>
+            <a:picLocks noChangeAspect="1"/>
+          </p:cNvPicPr>
+          <p:nvPr/>
+        </p:nvPicPr>
+        <p:blipFill>
+          <a:blip r:embed="rId2"/>
+          <a:stretch>
+            <a:fillRect/>
+          </a:stretch>
+        </p:blipFill>
         <p:spPr>
           <a:xfrm>
-            <a:off x="486138" y="2337847"/>
-            <a:ext cx="8221968" cy="3692563"/>
+            <a:off x="427030" y="2016322"/>
+            <a:ext cx="8272127" cy="4631614"/>
           </a:xfrm>
+          <a:prstGeom prst="rect">
+            <a:avLst/>
+          </a:prstGeom>
         </p:spPr>
-        <p:txBody>
-          <a:bodyPr anchor="t">
-            <a:normAutofit fontScale="85000" lnSpcReduction="10000"/>
+      </p:pic>
+      <p:sp>
+        <p:nvSpPr>
+          <p:cNvPr id="7" name="Título 1"/>
+          <p:cNvSpPr txBox="1">
+            <a:spLocks/>
+          </p:cNvSpPr>
+          <p:nvPr/>
+        </p:nvSpPr>
+        <p:spPr>
+          <a:xfrm>
+            <a:off x="783019" y="5733534"/>
+            <a:ext cx="3084646" cy="502176"/>
+          </a:xfrm>
+          <a:prstGeom prst="rect">
+            <a:avLst/>
+          </a:prstGeom>
+        </p:spPr>
+        <p:txBody>
+          <a:bodyPr vert="horz" lIns="91440" tIns="45720" rIns="91440" bIns="45720" rtlCol="0" anchor="b">
+            <a:normAutofit lnSpcReduction="10000"/>
           </a:bodyPr>
-          <a:lstStyle/>
-          <a:p>
-            <a:r>
-              <a:rPr lang="es-ES" dirty="0" smtClean="0"/>
-              <a:t>Las dos funciones principales de Processing son </a:t>
+          <a:lstStyle>
+            <a:lvl1pPr algn="l" defTabSz="457200" rtl="0" eaLnBrk="1" latinLnBrk="0" hangingPunct="1">
+              <a:spcBef>
+                <a:spcPct val="0"/>
+              </a:spcBef>
+              <a:buNone/>
+              <a:defRPr sz="2800" b="0" kern="1200" cap="all">
+                <a:solidFill>
+                  <a:schemeClr val="bg1"/>
+                </a:solidFill>
+                <a:latin typeface="+mj-lt"/>
+                <a:ea typeface="+mj-ea"/>
+                <a:cs typeface="+mj-cs"/>
+              </a:defRPr>
+            </a:lvl1pPr>
+            <a:lvl2pPr eaLnBrk="1" hangingPunct="1">
+              <a:defRPr>
+                <a:solidFill>
+                  <a:schemeClr val="tx2"/>
+                </a:solidFill>
+              </a:defRPr>
+            </a:lvl2pPr>
+            <a:lvl3pPr eaLnBrk="1" hangingPunct="1">
+              <a:defRPr>
+                <a:solidFill>
+                  <a:schemeClr val="tx2"/>
+                </a:solidFill>
+              </a:defRPr>
+            </a:lvl3pPr>
+            <a:lvl4pPr eaLnBrk="1" hangingPunct="1">
+              <a:defRPr>
+                <a:solidFill>
+                  <a:schemeClr val="tx2"/>
+                </a:solidFill>
+              </a:defRPr>
+            </a:lvl4pPr>
+            <a:lvl5pPr eaLnBrk="1" hangingPunct="1">
+              <a:defRPr>
+                <a:solidFill>
+                  <a:schemeClr val="tx2"/>
+                </a:solidFill>
+              </a:defRPr>
+            </a:lvl5pPr>
+            <a:lvl6pPr eaLnBrk="1" hangingPunct="1">
+              <a:defRPr>
+                <a:solidFill>
+                  <a:schemeClr val="tx2"/>
+                </a:solidFill>
+              </a:defRPr>
+            </a:lvl6pPr>
+            <a:lvl7pPr eaLnBrk="1" hangingPunct="1">
+              <a:defRPr>
+                <a:solidFill>
+                  <a:schemeClr val="tx2"/>
+                </a:solidFill>
+              </a:defRPr>
+            </a:lvl7pPr>
+            <a:lvl8pPr eaLnBrk="1" hangingPunct="1">
+              <a:defRPr>
+                <a:solidFill>
+                  <a:schemeClr val="tx2"/>
+                </a:solidFill>
+              </a:defRPr>
+            </a:lvl8pPr>
+            <a:lvl9pPr eaLnBrk="1" hangingPunct="1">
+              <a:defRPr>
+                <a:solidFill>
+                  <a:schemeClr val="tx2"/>
+                </a:solidFill>
+              </a:defRPr>
+            </a:lvl9pPr>
+          </a:lstStyle>
+          <a:p>
+            <a:r>
+              <a:rPr lang="es-ES" dirty="0" smtClean="0"/>
+              <a:t>Kike </a:t>
             </a:r>
             <a:r>
               <a:rPr lang="es-ES" dirty="0" err="1" smtClean="0"/>
-              <a:t>setup</a:t>
-            </a:r>
-            <a:r>
-              <a:rPr lang="es-ES" dirty="0" smtClean="0"/>
-              <a:t>()  y </a:t>
-            </a:r>
-            <a:r>
-              <a:rPr lang="es-ES" dirty="0" err="1" smtClean="0"/>
-              <a:t>draw</a:t>
-            </a:r>
-            <a:r>
-              <a:rPr lang="es-ES" dirty="0" smtClean="0"/>
-              <a:t>()</a:t>
-            </a:r>
-          </a:p>
-          <a:p>
-            <a:r>
-              <a:rPr lang="es-ES" dirty="0" smtClean="0"/>
-              <a:t>Estas funciones tenemos que escribirlas nosotros, porque son distintas para cada programa</a:t>
-            </a:r>
-          </a:p>
-          <a:p>
-            <a:pPr marL="936000" lvl="3" indent="0">
-              <a:buNone/>
-            </a:pPr>
-            <a:r>
-              <a:rPr lang="es-ES" sz="1900" dirty="0" err="1" smtClean="0"/>
-              <a:t>void</a:t>
-            </a:r>
-            <a:r>
-              <a:rPr lang="es-ES" sz="1900" dirty="0" smtClean="0"/>
-              <a:t> </a:t>
-            </a:r>
-            <a:r>
-              <a:rPr lang="es-ES" sz="1900" dirty="0" err="1" smtClean="0"/>
-              <a:t>setup</a:t>
-            </a:r>
-            <a:r>
-              <a:rPr lang="es-ES" sz="1900" dirty="0" smtClean="0"/>
-              <a:t>() </a:t>
-            </a:r>
-          </a:p>
-          <a:p>
-            <a:pPr marL="936000" lvl="3" indent="0">
-              <a:buNone/>
-            </a:pPr>
-            <a:r>
-              <a:rPr lang="es-ES" sz="1900" dirty="0" smtClean="0"/>
-              <a:t>{  // </a:t>
-            </a:r>
-            <a:r>
-              <a:rPr lang="es-ES" sz="1900" dirty="0" err="1" smtClean="0"/>
-              <a:t>iniciaizar</a:t>
-            </a:r>
-            <a:r>
-              <a:rPr lang="es-ES" sz="1900" dirty="0" smtClean="0"/>
-              <a:t> la aplicación</a:t>
-            </a:r>
-          </a:p>
-          <a:p>
-            <a:pPr marL="936000" lvl="3" indent="0">
-              <a:buNone/>
-            </a:pPr>
-            <a:r>
-              <a:rPr lang="es-ES" sz="1900" dirty="0"/>
-              <a:t>}</a:t>
-            </a:r>
-            <a:endParaRPr lang="es-ES" sz="1900" dirty="0" smtClean="0"/>
-          </a:p>
-          <a:p>
-            <a:pPr marL="936000" lvl="3" indent="0">
-              <a:buNone/>
-            </a:pPr>
-            <a:r>
-              <a:rPr lang="es-ES" sz="1900" dirty="0" err="1"/>
-              <a:t>v</a:t>
-            </a:r>
-            <a:r>
-              <a:rPr lang="es-ES" sz="1900" dirty="0" err="1" smtClean="0"/>
-              <a:t>oid</a:t>
-            </a:r>
-            <a:r>
-              <a:rPr lang="es-ES" sz="1900" dirty="0" smtClean="0"/>
-              <a:t> </a:t>
-            </a:r>
-            <a:r>
-              <a:rPr lang="es-ES" sz="1900" dirty="0" err="1" smtClean="0"/>
-              <a:t>draw</a:t>
-            </a:r>
-            <a:r>
-              <a:rPr lang="es-ES" sz="1900" dirty="0" smtClean="0"/>
-              <a:t>()</a:t>
-            </a:r>
-          </a:p>
-          <a:p>
-            <a:pPr marL="936000" lvl="3" indent="0">
-              <a:buNone/>
-            </a:pPr>
-            <a:r>
-              <a:rPr lang="es-ES" sz="1900" dirty="0" smtClean="0"/>
-              <a:t>{ // dibujar lo que sea….</a:t>
-            </a:r>
-          </a:p>
-          <a:p>
-            <a:pPr marL="936000" lvl="3" indent="0">
-              <a:buNone/>
-            </a:pPr>
-            <a:r>
-              <a:rPr lang="es-ES" sz="1900" dirty="0" smtClean="0"/>
-              <a:t>}</a:t>
-            </a:r>
-          </a:p>
-          <a:p>
-            <a:pPr marL="342900" indent="-342900">
-              <a:buFont typeface="Wingdings" panose="05000000000000000000" pitchFamily="2" charset="2"/>
-              <a:buChar char="§"/>
-            </a:pPr>
-            <a:r>
-              <a:rPr lang="es-ES" sz="1900" dirty="0" smtClean="0"/>
-              <a:t>El orden en que se escriben las funciones es irrelevante, pero el orden en que se escribe el código dentro de las funciones es de máxima importancia.</a:t>
-            </a:r>
-            <a:endParaRPr lang="es-ES" sz="1900" dirty="0"/>
+              <a:t>ramirez</a:t>
+            </a:r>
+            <a:endParaRPr lang="es-ES" dirty="0"/>
           </a:p>
         </p:txBody>
       </p:sp>
     </p:spTree>
     <p:extLst>
       <p:ext uri="{BB962C8B-B14F-4D97-AF65-F5344CB8AC3E}">
-        <p14:creationId xmlns:p14="http://schemas.microsoft.com/office/powerpoint/2010/main" val="1585716467"/>
+        <p14:creationId xmlns:p14="http://schemas.microsoft.com/office/powerpoint/2010/main" val="2104708128"/>
       </p:ext>
     </p:extLst>
   </p:cSld>
   <p:clrMapOvr>
     <a:masterClrMapping/>
   </p:clrMapOvr>
-  <p:timing>
-    <p:tnLst>
-      <p:par>
-        <p:cTn id="1" dur="indefinite" restart="never" nodeType="tmRoot"/>
-      </p:par>
-    </p:tnLst>
-  </p:timing>
 </p:sld>
 </file>
 
@@ -5780,196 +7355,153 @@
           <a:p>
             <a:r>
               <a:rPr lang="es-ES" dirty="0" smtClean="0"/>
-              <a:t>TIPOS DE DATOS PRIMITIVOS</a:t>
+              <a:t>Y muchos mas  ….</a:t>
             </a:r>
             <a:endParaRPr lang="es-ES" dirty="0"/>
           </a:p>
         </p:txBody>
       </p:sp>
-      <p:sp>
-        <p:nvSpPr>
-          <p:cNvPr id="3" name="Marcador de contenido 2"/>
-          <p:cNvSpPr>
-            <a:spLocks noGrp="1"/>
-          </p:cNvSpPr>
-          <p:nvPr>
-            <p:ph idx="1"/>
-          </p:nvPr>
-        </p:nvSpPr>
+      <p:pic>
+        <p:nvPicPr>
+          <p:cNvPr id="4" name="Imagen 3"/>
+          <p:cNvPicPr>
+            <a:picLocks noChangeAspect="1"/>
+          </p:cNvPicPr>
+          <p:nvPr/>
+        </p:nvPicPr>
+        <p:blipFill>
+          <a:blip r:embed="rId2"/>
+          <a:stretch>
+            <a:fillRect/>
+          </a:stretch>
+        </p:blipFill>
         <p:spPr>
           <a:xfrm>
-            <a:off x="581192" y="2060294"/>
-            <a:ext cx="7989751" cy="2770175"/>
-          </a:xfrm>
-        </p:spPr>
-        <p:txBody>
-          <a:bodyPr>
-            <a:normAutofit/>
-          </a:bodyPr>
-          <a:lstStyle/>
-          <a:p>
-            <a:pPr>
-              <a:buFont typeface="Wingdings" panose="05000000000000000000" pitchFamily="2" charset="2"/>
-              <a:buChar char="§"/>
-            </a:pPr>
-            <a:r>
-              <a:rPr lang="es-ES" dirty="0" smtClean="0"/>
-              <a:t>En java hay tipos de datos “primitivos” y tipos de datos complejos. </a:t>
-            </a:r>
-          </a:p>
-          <a:p>
-            <a:pPr>
-              <a:buFont typeface="Wingdings" panose="05000000000000000000" pitchFamily="2" charset="2"/>
-              <a:buChar char="§"/>
-            </a:pPr>
-            <a:r>
-              <a:rPr lang="es-ES" dirty="0" smtClean="0"/>
-              <a:t>Para crear una variable de un tipo de dato primitivo, basta con declarar que queremos usarla y asignarle un nombre. Se hace así: </a:t>
-            </a:r>
-          </a:p>
-          <a:p>
-            <a:pPr marL="0" indent="0" algn="ctr">
-              <a:buNone/>
-            </a:pPr>
-            <a:r>
-              <a:rPr lang="es-ES" dirty="0" err="1"/>
-              <a:t>f</a:t>
-            </a:r>
-            <a:r>
-              <a:rPr lang="es-ES" dirty="0" err="1" smtClean="0"/>
-              <a:t>loat</a:t>
-            </a:r>
-            <a:r>
-              <a:rPr lang="es-ES" dirty="0" smtClean="0"/>
-              <a:t> distancia=0; </a:t>
-            </a:r>
-          </a:p>
-          <a:p>
-            <a:pPr marL="0" indent="0" algn="ctr">
-              <a:buNone/>
-            </a:pPr>
-            <a:endParaRPr lang="es-ES" dirty="0"/>
-          </a:p>
-          <a:p>
-            <a:pPr>
-              <a:buFont typeface="Wingdings" panose="05000000000000000000" pitchFamily="2" charset="2"/>
-              <a:buChar char="§"/>
-            </a:pPr>
-            <a:r>
-              <a:rPr lang="es-ES" dirty="0" smtClean="0"/>
-              <a:t>Los tipos de datos primitivos son: </a:t>
-            </a:r>
-            <a:r>
-              <a:rPr lang="es-ES" dirty="0"/>
-              <a:t> </a:t>
-            </a:r>
-            <a:r>
-              <a:rPr lang="es-ES" dirty="0" smtClean="0"/>
-              <a:t>byte, short , </a:t>
-            </a:r>
-            <a:r>
-              <a:rPr lang="es-ES" dirty="0" err="1" smtClean="0"/>
-              <a:t>int</a:t>
-            </a:r>
-            <a:r>
-              <a:rPr lang="es-ES" dirty="0" smtClean="0"/>
-              <a:t> , </a:t>
-            </a:r>
-            <a:r>
-              <a:rPr lang="es-ES" dirty="0" err="1" smtClean="0"/>
-              <a:t>long</a:t>
-            </a:r>
-            <a:r>
-              <a:rPr lang="es-ES" dirty="0" smtClean="0"/>
-              <a:t> , </a:t>
-            </a:r>
-            <a:r>
-              <a:rPr lang="es-ES" dirty="0" err="1" smtClean="0"/>
-              <a:t>float</a:t>
-            </a:r>
-            <a:r>
-              <a:rPr lang="es-ES" dirty="0" smtClean="0"/>
-              <a:t>, </a:t>
-            </a:r>
-            <a:r>
-              <a:rPr lang="es-ES" dirty="0" err="1" smtClean="0"/>
-              <a:t>double</a:t>
-            </a:r>
-            <a:r>
-              <a:rPr lang="es-ES" dirty="0" smtClean="0"/>
-              <a:t>, </a:t>
-            </a:r>
-            <a:r>
-              <a:rPr lang="es-ES" dirty="0" err="1" smtClean="0"/>
-              <a:t>boolean</a:t>
-            </a:r>
-            <a:r>
-              <a:rPr lang="es-ES" dirty="0" smtClean="0"/>
-              <a:t>, </a:t>
-            </a:r>
-            <a:r>
-              <a:rPr lang="es-ES" dirty="0" err="1" smtClean="0"/>
-              <a:t>char</a:t>
-            </a:r>
-            <a:r>
-              <a:rPr lang="es-ES" dirty="0" smtClean="0"/>
-              <a:t>. </a:t>
-            </a:r>
-            <a:endParaRPr lang="es-ES" dirty="0" smtClean="0"/>
-          </a:p>
-        </p:txBody>
-      </p:sp>
-      <p:sp>
-        <p:nvSpPr>
-          <p:cNvPr id="4" name="Rectángulo 3"/>
-          <p:cNvSpPr/>
-          <p:nvPr/>
-        </p:nvSpPr>
-        <p:spPr>
-          <a:xfrm>
-            <a:off x="581192" y="5608948"/>
-            <a:ext cx="8129175" cy="369332"/>
+            <a:off x="508893" y="2421925"/>
+            <a:ext cx="8134350" cy="4065244"/>
           </a:xfrm>
           <a:prstGeom prst="rect">
             <a:avLst/>
           </a:prstGeom>
         </p:spPr>
-        <p:txBody>
-          <a:bodyPr wrap="square">
-            <a:spAutoFit/>
+      </p:pic>
+      <p:sp>
+        <p:nvSpPr>
+          <p:cNvPr id="5" name="Título 1"/>
+          <p:cNvSpPr txBox="1">
+            <a:spLocks/>
+          </p:cNvSpPr>
+          <p:nvPr/>
+        </p:nvSpPr>
+        <p:spPr>
+          <a:xfrm>
+            <a:off x="508893" y="1919749"/>
+            <a:ext cx="8134350" cy="502176"/>
+          </a:xfrm>
+          <a:prstGeom prst="rect">
+            <a:avLst/>
+          </a:prstGeom>
+        </p:spPr>
+        <p:txBody>
+          <a:bodyPr vert="horz" lIns="91440" tIns="45720" rIns="91440" bIns="45720" rtlCol="0" anchor="b">
+            <a:normAutofit fontScale="92500"/>
           </a:bodyPr>
-          <a:lstStyle/>
-          <a:p>
-            <a:pPr algn="ctr"/>
-            <a:r>
-              <a:rPr lang="es-ES" dirty="0"/>
-              <a:t> </a:t>
-            </a:r>
-            <a:r>
-              <a:rPr lang="es-ES" b="1" dirty="0"/>
-              <a:t>http://www.tutorialspoint.com/java/java_basic_datatypes.htm</a:t>
-            </a:r>
-            <a:endParaRPr lang="es-ES" dirty="0"/>
+          <a:lstStyle>
+            <a:lvl1pPr algn="l" defTabSz="457200" rtl="0" eaLnBrk="1" latinLnBrk="0" hangingPunct="1">
+              <a:spcBef>
+                <a:spcPct val="0"/>
+              </a:spcBef>
+              <a:buNone/>
+              <a:defRPr sz="2800" b="0" kern="1200" cap="all">
+                <a:solidFill>
+                  <a:schemeClr val="bg1"/>
+                </a:solidFill>
+                <a:latin typeface="+mj-lt"/>
+                <a:ea typeface="+mj-ea"/>
+                <a:cs typeface="+mj-cs"/>
+              </a:defRPr>
+            </a:lvl1pPr>
+            <a:lvl2pPr eaLnBrk="1" hangingPunct="1">
+              <a:defRPr>
+                <a:solidFill>
+                  <a:schemeClr val="tx2"/>
+                </a:solidFill>
+              </a:defRPr>
+            </a:lvl2pPr>
+            <a:lvl3pPr eaLnBrk="1" hangingPunct="1">
+              <a:defRPr>
+                <a:solidFill>
+                  <a:schemeClr val="tx2"/>
+                </a:solidFill>
+              </a:defRPr>
+            </a:lvl3pPr>
+            <a:lvl4pPr eaLnBrk="1" hangingPunct="1">
+              <a:defRPr>
+                <a:solidFill>
+                  <a:schemeClr val="tx2"/>
+                </a:solidFill>
+              </a:defRPr>
+            </a:lvl4pPr>
+            <a:lvl5pPr eaLnBrk="1" hangingPunct="1">
+              <a:defRPr>
+                <a:solidFill>
+                  <a:schemeClr val="tx2"/>
+                </a:solidFill>
+              </a:defRPr>
+            </a:lvl5pPr>
+            <a:lvl6pPr eaLnBrk="1" hangingPunct="1">
+              <a:defRPr>
+                <a:solidFill>
+                  <a:schemeClr val="tx2"/>
+                </a:solidFill>
+              </a:defRPr>
+            </a:lvl6pPr>
+            <a:lvl7pPr eaLnBrk="1" hangingPunct="1">
+              <a:defRPr>
+                <a:solidFill>
+                  <a:schemeClr val="tx2"/>
+                </a:solidFill>
+              </a:defRPr>
+            </a:lvl7pPr>
+            <a:lvl8pPr eaLnBrk="1" hangingPunct="1">
+              <a:defRPr>
+                <a:solidFill>
+                  <a:schemeClr val="tx2"/>
+                </a:solidFill>
+              </a:defRPr>
+            </a:lvl8pPr>
+            <a:lvl9pPr eaLnBrk="1" hangingPunct="1">
+              <a:defRPr>
+                <a:solidFill>
+                  <a:schemeClr val="tx2"/>
+                </a:solidFill>
+              </a:defRPr>
+            </a:lvl9pPr>
+          </a:lstStyle>
+          <a:p>
+            <a:r>
+              <a:rPr lang="es-ES" dirty="0">
+                <a:solidFill>
+                  <a:schemeClr val="accent3">
+                    <a:lumMod val="50000"/>
+                  </a:schemeClr>
+                </a:solidFill>
+              </a:rPr>
+              <a:t>https://www.openprocessing.org/browse</a:t>
+            </a:r>
           </a:p>
         </p:txBody>
       </p:sp>
     </p:spTree>
     <p:extLst>
       <p:ext uri="{BB962C8B-B14F-4D97-AF65-F5344CB8AC3E}">
-        <p14:creationId xmlns:p14="http://schemas.microsoft.com/office/powerpoint/2010/main" val="2235747137"/>
+        <p14:creationId xmlns:p14="http://schemas.microsoft.com/office/powerpoint/2010/main" val="569477433"/>
       </p:ext>
     </p:extLst>
   </p:cSld>
   <p:clrMapOvr>
     <a:masterClrMapping/>
   </p:clrMapOvr>
-  <p:timing>
-    <p:tnLst>
-      <p:par>
-        <p:cTn id="1" dur="indefinite" restart="never" nodeType="tmRoot"/>
-      </p:par>
-    </p:tnLst>
-  </p:timing>
 </p:sld>
 </file>
 
@@ -6007,7 +7539,18 @@
           <a:p>
             <a:r>
               <a:rPr lang="es-ES" dirty="0" smtClean="0"/>
-              <a:t>TIPOS DE DATOS COMPLEJOS, objetos</a:t>
+              <a:t>Nos tiramos a la piscina …</a:t>
+            </a:r>
+            <a:br>
+              <a:rPr lang="es-ES" dirty="0" smtClean="0"/>
+            </a:br>
+            <a:r>
+              <a:rPr lang="es-ES" dirty="0" smtClean="0"/>
+              <a:t>Pasos </a:t>
+            </a:r>
+            <a:r>
+              <a:rPr lang="es-ES" dirty="0" smtClean="0"/>
+              <a:t>a seguir</a:t>
             </a:r>
             <a:endParaRPr lang="es-ES" dirty="0"/>
           </a:p>
@@ -6025,310 +7568,140 @@
         </p:nvSpPr>
         <p:spPr>
           <a:xfrm>
-            <a:off x="581192" y="2060293"/>
-            <a:ext cx="8342889" cy="4699321"/>
+            <a:off x="581192" y="2113005"/>
+            <a:ext cx="7989752" cy="4449841"/>
           </a:xfrm>
         </p:spPr>
         <p:txBody>
           <a:bodyPr>
-            <a:normAutofit fontScale="92500" lnSpcReduction="20000"/>
+            <a:normAutofit/>
           </a:bodyPr>
           <a:lstStyle/>
           <a:p>
-            <a:pPr>
-              <a:buFont typeface="Wingdings" panose="05000000000000000000" pitchFamily="2" charset="2"/>
-              <a:buChar char="§"/>
-            </a:pPr>
-            <a:r>
-              <a:rPr lang="es-ES" dirty="0" smtClean="0"/>
-              <a:t>Los tipos de datos complejos son objetos. </a:t>
-            </a:r>
-          </a:p>
-          <a:p>
-            <a:pPr>
-              <a:buFont typeface="Wingdings" panose="05000000000000000000" pitchFamily="2" charset="2"/>
-              <a:buChar char="§"/>
-            </a:pPr>
-            <a:r>
-              <a:rPr lang="es-ES" dirty="0" smtClean="0"/>
-              <a:t>Los objetos se definen mediante clases. </a:t>
-            </a:r>
-          </a:p>
-          <a:p>
-            <a:pPr>
-              <a:buFont typeface="Wingdings" panose="05000000000000000000" pitchFamily="2" charset="2"/>
-              <a:buChar char="§"/>
-            </a:pPr>
-            <a:r>
-              <a:rPr lang="es-ES" dirty="0" smtClean="0"/>
-              <a:t>Para usar uno objeto hay que declarar una definir la clase, declarar la variable y después crear el objeto con </a:t>
+            <a:endParaRPr lang="es-ES" dirty="0" smtClean="0"/>
+          </a:p>
+          <a:p>
+            <a:r>
+              <a:rPr lang="es-ES" dirty="0" smtClean="0"/>
+              <a:t>Instalar </a:t>
+            </a:r>
+            <a:r>
+              <a:rPr lang="es-ES" dirty="0" smtClean="0"/>
+              <a:t>el IDE de </a:t>
+            </a:r>
+            <a:r>
+              <a:rPr lang="es-ES" dirty="0" smtClean="0"/>
+              <a:t>Processing </a:t>
+            </a:r>
+            <a:r>
+              <a:rPr lang="es-ES" b="1" dirty="0"/>
+              <a:t>https://</a:t>
             </a:r>
             <a:r>
               <a:rPr lang="es-ES" b="1" dirty="0" smtClean="0"/>
-              <a:t>new. </a:t>
-            </a:r>
-          </a:p>
-          <a:p>
-            <a:pPr>
-              <a:buFont typeface="Wingdings" panose="05000000000000000000" pitchFamily="2" charset="2"/>
-              <a:buChar char="§"/>
-            </a:pPr>
-            <a:r>
-              <a:rPr lang="es-ES" dirty="0" smtClean="0"/>
-              <a:t>En Processing ya hay definidas muchas clases muy útiles, pero para usarlas hay que declararlas y crearlas. Algo así:   </a:t>
-            </a:r>
-          </a:p>
-          <a:p>
-            <a:pPr marL="324000" lvl="1" indent="0">
-              <a:buNone/>
-            </a:pPr>
-            <a:r>
-              <a:rPr lang="es-ES" dirty="0" err="1" smtClean="0"/>
-              <a:t>public</a:t>
+              <a:t>www.processing.org/download </a:t>
+            </a:r>
+            <a:endParaRPr lang="es-ES" b="1" dirty="0" smtClean="0"/>
+          </a:p>
+          <a:p>
+            <a:r>
+              <a:rPr lang="es-ES" dirty="0" smtClean="0"/>
+              <a:t>Seguir </a:t>
+            </a:r>
+            <a:r>
+              <a:rPr lang="es-ES" dirty="0"/>
+              <a:t>los tutoriales: </a:t>
             </a:r>
             <a:r>
               <a:rPr lang="es-ES" dirty="0" smtClean="0"/>
               <a:t> </a:t>
             </a:r>
             <a:r>
-              <a:rPr lang="es-ES" dirty="0" err="1" smtClean="0"/>
-              <a:t>class</a:t>
-            </a:r>
-            <a:r>
-              <a:rPr lang="es-ES" dirty="0" smtClean="0"/>
-              <a:t> Punto</a:t>
-            </a:r>
-          </a:p>
-          <a:p>
-            <a:pPr marL="324000" lvl="1" indent="0">
-              <a:buNone/>
-            </a:pPr>
-            <a:r>
-              <a:rPr lang="es-ES" dirty="0" smtClean="0"/>
-              <a:t>{ </a:t>
-            </a:r>
-            <a:r>
-              <a:rPr lang="es-ES" dirty="0" err="1" smtClean="0"/>
-              <a:t>float</a:t>
-            </a:r>
-            <a:r>
-              <a:rPr lang="es-ES" dirty="0" smtClean="0"/>
-              <a:t> x;</a:t>
-            </a:r>
-          </a:p>
-          <a:p>
-            <a:pPr marL="324000" lvl="1" indent="0">
-              <a:buNone/>
-            </a:pPr>
-            <a:r>
-              <a:rPr lang="es-ES" dirty="0" err="1" smtClean="0"/>
-              <a:t>Float</a:t>
-            </a:r>
-            <a:r>
-              <a:rPr lang="es-ES" dirty="0" smtClean="0"/>
-              <a:t> y;</a:t>
-            </a:r>
-          </a:p>
-          <a:p>
-            <a:pPr marL="324000" lvl="1" indent="0">
-              <a:buNone/>
-            </a:pPr>
-            <a:r>
-              <a:rPr lang="es-ES" dirty="0" smtClean="0"/>
-              <a:t>Punto (</a:t>
-            </a:r>
-            <a:r>
-              <a:rPr lang="es-ES" dirty="0" err="1" smtClean="0"/>
-              <a:t>float</a:t>
-            </a:r>
-            <a:r>
-              <a:rPr lang="es-ES" dirty="0" smtClean="0"/>
+              <a:rPr lang="es-ES" b="1" dirty="0" smtClean="0"/>
+              <a:t>https</a:t>
+            </a:r>
+            <a:r>
+              <a:rPr lang="es-ES" b="1" dirty="0"/>
+              <a:t>://www.processing.org/tutorials/gettingstarted/</a:t>
+            </a:r>
+          </a:p>
+          <a:p>
+            <a:r>
+              <a:rPr lang="es-ES" dirty="0" smtClean="0"/>
+              <a:t>Proponerse </a:t>
+            </a:r>
+            <a:r>
+              <a:rPr lang="es-ES" dirty="0" smtClean="0"/>
+              <a:t>un proyecto nuevo…. así según vayamos aprendiendo iremos evaluando si eso será útil a nuestro proyecto.</a:t>
+            </a:r>
+          </a:p>
+          <a:p>
+            <a:r>
+              <a:rPr lang="es-ES" dirty="0" smtClean="0"/>
+              <a:t>Ejecutar y modificar los ejemplos que vienen con Processing. </a:t>
+            </a:r>
+          </a:p>
+          <a:p>
+            <a:r>
+              <a:rPr lang="es-ES" dirty="0" smtClean="0"/>
+              <a:t>Buscar en </a:t>
+            </a:r>
+            <a:r>
+              <a:rPr lang="es-ES" sz="2400" b="1" dirty="0" err="1" smtClean="0"/>
+              <a:t>OpenProcessing</a:t>
+            </a:r>
+            <a:r>
+              <a:rPr lang="es-ES" sz="2400" dirty="0" smtClean="0"/>
               <a:t> </a:t>
             </a:r>
             <a:r>
-              <a:rPr lang="es-ES" dirty="0" err="1" smtClean="0"/>
-              <a:t>x_inicial</a:t>
-            </a:r>
-            <a:r>
-              <a:rPr lang="es-ES" dirty="0" smtClean="0"/>
-              <a:t>, </a:t>
-            </a:r>
-            <a:r>
-              <a:rPr lang="es-ES" dirty="0" err="1" smtClean="0"/>
-              <a:t>float</a:t>
-            </a:r>
-            <a:r>
-              <a:rPr lang="es-ES" dirty="0" smtClean="0"/>
-              <a:t> </a:t>
-            </a:r>
-            <a:r>
-              <a:rPr lang="es-ES" dirty="0" err="1" smtClean="0"/>
-              <a:t>y_inicial</a:t>
-            </a:r>
-            <a:r>
-              <a:rPr lang="es-ES" dirty="0" smtClean="0"/>
-              <a:t>) { x=</a:t>
-            </a:r>
-            <a:r>
-              <a:rPr lang="es-ES" dirty="0" err="1" smtClean="0"/>
-              <a:t>x_inicial</a:t>
-            </a:r>
-            <a:r>
-              <a:rPr lang="es-ES" dirty="0" smtClean="0"/>
-              <a:t>; y=</a:t>
-            </a:r>
-            <a:r>
-              <a:rPr lang="es-ES" dirty="0" err="1" smtClean="0"/>
-              <a:t>y_inicial</a:t>
-            </a:r>
-            <a:r>
-              <a:rPr lang="es-ES" dirty="0" smtClean="0"/>
-              <a:t>;}</a:t>
-            </a:r>
-          </a:p>
-          <a:p>
-            <a:pPr marL="324000" lvl="1" indent="0">
-              <a:buNone/>
-            </a:pPr>
-            <a:r>
-              <a:rPr lang="es-ES" dirty="0" err="1"/>
-              <a:t>v</a:t>
-            </a:r>
-            <a:r>
-              <a:rPr lang="es-ES" dirty="0" err="1" smtClean="0"/>
-              <a:t>oid</a:t>
-            </a:r>
-            <a:r>
-              <a:rPr lang="es-ES" dirty="0" smtClean="0"/>
-              <a:t> Pinta() { </a:t>
-            </a:r>
-            <a:r>
-              <a:rPr lang="es-ES" dirty="0" err="1" smtClean="0"/>
-              <a:t>point</a:t>
-            </a:r>
-            <a:r>
-              <a:rPr lang="es-ES" dirty="0" smtClean="0"/>
-              <a:t> ( x, y);	}</a:t>
-            </a:r>
-          </a:p>
-          <a:p>
-            <a:pPr marL="324000" lvl="1" indent="0">
-              <a:buNone/>
-            </a:pPr>
-            <a:r>
-              <a:rPr lang="es-ES" dirty="0" err="1"/>
-              <a:t>v</a:t>
-            </a:r>
-            <a:r>
-              <a:rPr lang="es-ES" dirty="0" err="1" smtClean="0"/>
-              <a:t>oid</a:t>
-            </a:r>
-            <a:r>
-              <a:rPr lang="es-ES" dirty="0" smtClean="0"/>
-              <a:t> Desplaza(</a:t>
-            </a:r>
-            <a:r>
-              <a:rPr lang="es-ES" dirty="0" err="1" smtClean="0"/>
-              <a:t>float</a:t>
-            </a:r>
-            <a:r>
-              <a:rPr lang="es-ES" dirty="0" smtClean="0"/>
-              <a:t> </a:t>
-            </a:r>
-            <a:r>
-              <a:rPr lang="es-ES" dirty="0" err="1" smtClean="0"/>
-              <a:t>desplazaX</a:t>
-            </a:r>
-            <a:r>
-              <a:rPr lang="es-ES" dirty="0" smtClean="0"/>
-              <a:t>, </a:t>
-            </a:r>
-            <a:r>
-              <a:rPr lang="es-ES" dirty="0" err="1" smtClean="0"/>
-              <a:t>float</a:t>
-            </a:r>
-            <a:r>
-              <a:rPr lang="es-ES" dirty="0" smtClean="0"/>
-              <a:t> </a:t>
-            </a:r>
-            <a:r>
-              <a:rPr lang="es-ES" dirty="0" err="1" smtClean="0"/>
-              <a:t>desplazaY</a:t>
-            </a:r>
-            <a:r>
-              <a:rPr lang="es-ES" dirty="0" smtClean="0"/>
-              <a:t>) {x+=</a:t>
-            </a:r>
-            <a:r>
-              <a:rPr lang="es-ES" dirty="0" err="1" smtClean="0"/>
-              <a:t>desplazaX</a:t>
-            </a:r>
-            <a:r>
-              <a:rPr lang="es-ES" dirty="0" smtClean="0"/>
-              <a:t>; y+=</a:t>
-            </a:r>
-            <a:r>
-              <a:rPr lang="es-ES" dirty="0" err="1" smtClean="0"/>
-              <a:t>desplazaY</a:t>
-            </a:r>
-            <a:r>
-              <a:rPr lang="es-ES" dirty="0" smtClean="0"/>
-              <a:t>; }</a:t>
-            </a:r>
-          </a:p>
-          <a:p>
-            <a:pPr marL="324000" lvl="1" indent="0">
-              <a:buNone/>
-            </a:pPr>
-            <a:r>
-              <a:rPr lang="es-ES" dirty="0" smtClean="0"/>
-              <a:t>}</a:t>
-            </a:r>
-          </a:p>
-          <a:p>
-            <a:pPr marL="324000" lvl="1" indent="0">
-              <a:buNone/>
-            </a:pPr>
-            <a:r>
-              <a:rPr lang="es-ES" dirty="0" smtClean="0"/>
-              <a:t>Punto </a:t>
-            </a:r>
-            <a:r>
-              <a:rPr lang="es-ES" dirty="0" err="1" smtClean="0"/>
-              <a:t>m_punto</a:t>
-            </a:r>
-            <a:r>
-              <a:rPr lang="es-ES" dirty="0" smtClean="0"/>
-              <a:t> = new Punto(0, 0);</a:t>
-            </a:r>
-          </a:p>
-          <a:p>
-            <a:pPr marL="324000" lvl="1" indent="0">
-              <a:buNone/>
-            </a:pPr>
-            <a:r>
-              <a:rPr lang="es-ES" dirty="0" err="1" smtClean="0"/>
-              <a:t>m_punto.pinta</a:t>
-            </a:r>
-            <a:r>
-              <a:rPr lang="es-ES" dirty="0" smtClean="0"/>
-              <a:t>();</a:t>
+              <a:rPr lang="es-ES" dirty="0" smtClean="0"/>
+              <a:t>un proyecto ya realizado, estudiarlo, entenderlo, y modificarlo. </a:t>
+            </a:r>
+          </a:p>
+          <a:p>
+            <a:pPr lvl="1"/>
+            <a:r>
+              <a:rPr lang="es-ES" dirty="0">
+                <a:hlinkClick r:id="rId3"/>
+              </a:rPr>
+              <a:t>http://openprocessing.org/browse</a:t>
+            </a:r>
+            <a:r>
+              <a:rPr lang="es-ES" dirty="0" smtClean="0">
+                <a:hlinkClick r:id="rId3"/>
+              </a:rPr>
+              <a:t>/</a:t>
             </a:r>
             <a:endParaRPr lang="es-ES" dirty="0" smtClean="0"/>
           </a:p>
           <a:p>
-            <a:pPr>
-              <a:buFont typeface="Wingdings" panose="05000000000000000000" pitchFamily="2" charset="2"/>
-              <a:buChar char="§"/>
-            </a:pPr>
-            <a:endParaRPr lang="es-ES" b="1" dirty="0" smtClean="0"/>
+            <a:r>
+              <a:rPr lang="es-ES" dirty="0" smtClean="0"/>
+              <a:t> Aprender </a:t>
+            </a:r>
+            <a:r>
+              <a:rPr lang="es-ES" dirty="0" smtClean="0"/>
+              <a:t>Java básico</a:t>
+            </a:r>
+            <a:r>
+              <a:rPr lang="es-ES" dirty="0" smtClean="0"/>
+              <a:t>….</a:t>
+            </a:r>
+            <a:endParaRPr lang="es-ES" dirty="0" smtClean="0"/>
+          </a:p>
+          <a:p>
+            <a:endParaRPr lang="es-ES" dirty="0" smtClean="0"/>
+          </a:p>
+          <a:p>
+            <a:endParaRPr lang="es-ES" dirty="0" smtClean="0"/>
           </a:p>
         </p:txBody>
       </p:sp>
     </p:spTree>
     <p:extLst>
       <p:ext uri="{BB962C8B-B14F-4D97-AF65-F5344CB8AC3E}">
-        <p14:creationId xmlns:p14="http://schemas.microsoft.com/office/powerpoint/2010/main" val="538810946"/>
+        <p14:creationId xmlns:p14="http://schemas.microsoft.com/office/powerpoint/2010/main" val="1689878665"/>
       </p:ext>
     </p:extLst>
   </p:cSld>
@@ -6379,7 +7752,7 @@
           <a:p>
             <a:r>
               <a:rPr lang="es-ES" dirty="0" smtClean="0"/>
-              <a:t>estructuras de control</a:t>
+              <a:t>ANATOMIA DE UNA APLICACIÓN PROCESSING</a:t>
             </a:r>
             <a:endParaRPr lang="es-ES" dirty="0"/>
           </a:p>
@@ -6387,7 +7760,7 @@
       </p:sp>
       <p:sp>
         <p:nvSpPr>
-          <p:cNvPr id="4" name="Marcador de contenido 3"/>
+          <p:cNvPr id="5" name="Marcador de contenido 3"/>
           <p:cNvSpPr>
             <a:spLocks noGrp="1"/>
           </p:cNvSpPr>
@@ -6395,172 +7768,153 @@
             <p:ph idx="1"/>
           </p:nvPr>
         </p:nvSpPr>
-        <p:spPr/>
-        <p:txBody>
-          <a:bodyPr/>
+        <p:spPr>
+          <a:xfrm>
+            <a:off x="486138" y="2337847"/>
+            <a:ext cx="8221968" cy="3692563"/>
+          </a:xfrm>
+        </p:spPr>
+        <p:txBody>
+          <a:bodyPr anchor="t">
+            <a:normAutofit fontScale="85000" lnSpcReduction="10000"/>
+          </a:bodyPr>
           <a:lstStyle/>
           <a:p>
             <a:r>
               <a:rPr lang="es-ES" dirty="0" smtClean="0"/>
-              <a:t>Nos permiten dar unas órdenes y otras dependiendo de los datos que tengamos:</a:t>
-            </a:r>
-          </a:p>
-          <a:p>
+              <a:t>Las dos funciones principales de Processing son </a:t>
+            </a:r>
             <a:r>
               <a:rPr lang="es-ES" dirty="0" err="1" smtClean="0"/>
-              <a:t>if</a:t>
-            </a:r>
-            <a:r>
-              <a:rPr lang="es-ES" dirty="0" smtClean="0"/>
-              <a:t> , </a:t>
+              <a:t>setup</a:t>
+            </a:r>
+            <a:r>
+              <a:rPr lang="es-ES" dirty="0" smtClean="0"/>
+              <a:t>()  y </a:t>
             </a:r>
             <a:r>
               <a:rPr lang="es-ES" dirty="0" err="1" smtClean="0"/>
-              <a:t>else</a:t>
-            </a:r>
-            <a:r>
-              <a:rPr lang="es-ES" dirty="0" smtClean="0"/>
-              <a:t>:    </a:t>
-            </a:r>
-            <a:r>
-              <a:rPr lang="es-ES" dirty="0" err="1" smtClean="0"/>
-              <a:t>if</a:t>
-            </a:r>
-            <a:r>
-              <a:rPr lang="es-ES" dirty="0" smtClean="0"/>
-              <a:t> (x&gt;=0) {</a:t>
-            </a:r>
-            <a:r>
-              <a:rPr lang="es-ES" dirty="0" err="1" smtClean="0"/>
-              <a:t>pintaX</a:t>
-            </a:r>
-            <a:r>
-              <a:rPr lang="es-ES" dirty="0" smtClean="0"/>
-              <a:t>(); } </a:t>
-            </a:r>
-            <a:r>
-              <a:rPr lang="es-ES" dirty="0" err="1" smtClean="0"/>
-              <a:t>else</a:t>
-            </a:r>
-            <a:r>
-              <a:rPr lang="es-ES" dirty="0" smtClean="0"/>
+              <a:t>draw</a:t>
+            </a:r>
+            <a:r>
+              <a:rPr lang="es-ES" dirty="0" smtClean="0"/>
+              <a:t>()</a:t>
+            </a:r>
+          </a:p>
+          <a:p>
+            <a:r>
+              <a:rPr lang="es-ES" dirty="0" smtClean="0"/>
+              <a:t>Estas funciones tenemos que escribirlas nosotros, porque son distintas para cada programa</a:t>
+            </a:r>
+          </a:p>
+          <a:p>
+            <a:pPr marL="936000" lvl="3" indent="0">
+              <a:buNone/>
+            </a:pPr>
+            <a:r>
+              <a:rPr lang="es-ES" sz="1900" dirty="0" err="1" smtClean="0"/>
+              <a:t>void</a:t>
+            </a:r>
+            <a:r>
+              <a:rPr lang="es-ES" sz="1900" dirty="0" smtClean="0"/>
               <a:t> </a:t>
             </a:r>
             <a:r>
-              <a:rPr lang="es-ES" dirty="0" err="1" smtClean="0"/>
-              <a:t>pintaY</a:t>
-            </a:r>
-            <a:r>
-              <a:rPr lang="es-ES" dirty="0" smtClean="0"/>
-              <a:t>(); </a:t>
-            </a:r>
-            <a:endParaRPr lang="es-ES" dirty="0"/>
-          </a:p>
-          <a:p>
-            <a:r>
-              <a:rPr lang="es-ES" dirty="0" err="1" smtClean="0"/>
-              <a:t>while</a:t>
-            </a:r>
-            <a:r>
-              <a:rPr lang="es-ES" dirty="0" smtClean="0"/>
-              <a:t> :  </a:t>
-            </a:r>
-            <a:r>
-              <a:rPr lang="es-ES" dirty="0" err="1" smtClean="0"/>
-              <a:t>while</a:t>
-            </a:r>
-            <a:r>
-              <a:rPr lang="es-ES" dirty="0" smtClean="0"/>
-              <a:t> (contador &gt;0) </a:t>
-            </a:r>
-            <a:r>
-              <a:rPr lang="es-ES" dirty="0" err="1" smtClean="0"/>
-              <a:t>pintaX</a:t>
-            </a:r>
-            <a:r>
-              <a:rPr lang="es-ES" dirty="0" smtClean="0"/>
-              <a:t>(); </a:t>
-            </a:r>
-            <a:r>
-              <a:rPr lang="es-ES" dirty="0" err="1" smtClean="0"/>
-              <a:t>else</a:t>
-            </a:r>
-            <a:r>
-              <a:rPr lang="es-ES" dirty="0" smtClean="0"/>
-              <a:t> contador=contador-1;</a:t>
-            </a:r>
-          </a:p>
-          <a:p>
-            <a:r>
-              <a:rPr lang="es-ES" dirty="0" err="1" smtClean="0"/>
-              <a:t>for</a:t>
-            </a:r>
-            <a:r>
-              <a:rPr lang="es-ES" dirty="0" smtClean="0"/>
-              <a:t> : </a:t>
-            </a:r>
-            <a:r>
-              <a:rPr lang="es-ES" dirty="0" err="1" smtClean="0"/>
-              <a:t>for</a:t>
-            </a:r>
-            <a:r>
-              <a:rPr lang="es-ES" dirty="0" smtClean="0"/>
-              <a:t> (</a:t>
-            </a:r>
-            <a:r>
-              <a:rPr lang="es-ES" dirty="0" err="1" smtClean="0"/>
-              <a:t>int</a:t>
-            </a:r>
-            <a:r>
-              <a:rPr lang="es-ES" dirty="0" smtClean="0"/>
-              <a:t> contador =0; contador &lt;100; contador ++) </a:t>
-            </a:r>
-            <a:r>
-              <a:rPr lang="es-ES" dirty="0" err="1" smtClean="0"/>
-              <a:t>pintaX</a:t>
-            </a:r>
-            <a:r>
-              <a:rPr lang="es-ES" dirty="0" smtClean="0"/>
-              <a:t>();</a:t>
-            </a:r>
-          </a:p>
-          <a:p>
-            <a:r>
-              <a:rPr lang="es-ES" dirty="0" err="1" smtClean="0"/>
-              <a:t>switch</a:t>
-            </a:r>
-            <a:r>
-              <a:rPr lang="es-ES" dirty="0" smtClean="0"/>
-              <a:t>…..</a:t>
-            </a:r>
-          </a:p>
-          <a:p>
-            <a:r>
-              <a:rPr lang="es-ES" dirty="0" err="1" smtClean="0"/>
-              <a:t>etc</a:t>
-            </a:r>
-            <a:r>
-              <a:rPr lang="es-ES" dirty="0" smtClean="0"/>
-              <a:t>, </a:t>
-            </a:r>
-            <a:r>
-              <a:rPr lang="es-ES" dirty="0" err="1" smtClean="0"/>
-              <a:t>etc</a:t>
-            </a:r>
-            <a:endParaRPr lang="es-ES" dirty="0" smtClean="0"/>
-          </a:p>
-          <a:p>
-            <a:pPr marL="0" indent="0">
+              <a:rPr lang="es-ES" sz="1900" dirty="0" err="1" smtClean="0"/>
+              <a:t>setup</a:t>
+            </a:r>
+            <a:r>
+              <a:rPr lang="es-ES" sz="1900" dirty="0" smtClean="0"/>
+              <a:t>() </a:t>
+            </a:r>
+          </a:p>
+          <a:p>
+            <a:pPr marL="936000" lvl="3" indent="0">
               <a:buNone/>
             </a:pPr>
-            <a:endParaRPr lang="es-ES" dirty="0" smtClean="0"/>
+            <a:r>
+              <a:rPr lang="es-ES" sz="1900" dirty="0" smtClean="0"/>
+              <a:t>{  // </a:t>
+            </a:r>
+            <a:r>
+              <a:rPr lang="es-ES" sz="1900" dirty="0" err="1" smtClean="0"/>
+              <a:t>iniciaizar</a:t>
+            </a:r>
+            <a:r>
+              <a:rPr lang="es-ES" sz="1900" dirty="0" smtClean="0"/>
+              <a:t> la aplicación</a:t>
+            </a:r>
+          </a:p>
+          <a:p>
+            <a:pPr marL="936000" lvl="3" indent="0">
+              <a:buNone/>
+            </a:pPr>
+            <a:r>
+              <a:rPr lang="es-ES" sz="1900" dirty="0"/>
+              <a:t>}</a:t>
+            </a:r>
+            <a:endParaRPr lang="es-ES" sz="1900" dirty="0" smtClean="0"/>
+          </a:p>
+          <a:p>
+            <a:pPr marL="936000" lvl="3" indent="0">
+              <a:buNone/>
+            </a:pPr>
+            <a:r>
+              <a:rPr lang="es-ES" sz="1900" dirty="0" err="1"/>
+              <a:t>v</a:t>
+            </a:r>
+            <a:r>
+              <a:rPr lang="es-ES" sz="1900" dirty="0" err="1" smtClean="0"/>
+              <a:t>oid</a:t>
+            </a:r>
+            <a:r>
+              <a:rPr lang="es-ES" sz="1900" dirty="0" smtClean="0"/>
+              <a:t> </a:t>
+            </a:r>
+            <a:r>
+              <a:rPr lang="es-ES" sz="1900" dirty="0" err="1" smtClean="0"/>
+              <a:t>draw</a:t>
+            </a:r>
+            <a:r>
+              <a:rPr lang="es-ES" sz="1900" dirty="0" smtClean="0"/>
+              <a:t>()</a:t>
+            </a:r>
+          </a:p>
+          <a:p>
+            <a:pPr marL="936000" lvl="3" indent="0">
+              <a:buNone/>
+            </a:pPr>
+            <a:r>
+              <a:rPr lang="es-ES" sz="1900" dirty="0" smtClean="0"/>
+              <a:t>{ // dibujar lo que sea….</a:t>
+            </a:r>
+          </a:p>
+          <a:p>
+            <a:pPr marL="936000" lvl="3" indent="0">
+              <a:buNone/>
+            </a:pPr>
+            <a:r>
+              <a:rPr lang="es-ES" sz="1900" dirty="0" smtClean="0"/>
+              <a:t>}</a:t>
+            </a:r>
+          </a:p>
+          <a:p>
+            <a:pPr marL="342900" indent="-342900">
+              <a:buFont typeface="Wingdings" panose="05000000000000000000" pitchFamily="2" charset="2"/>
+              <a:buChar char="§"/>
+            </a:pPr>
+            <a:r>
+              <a:rPr lang="es-ES" sz="1900" dirty="0" smtClean="0"/>
+              <a:t>El orden en que se escriben las funciones es irrelevante, pero el orden en que se escribe el código dentro de las funciones es de máxima importancia.</a:t>
+            </a:r>
+            <a:endParaRPr lang="es-ES" sz="1900" dirty="0"/>
           </a:p>
         </p:txBody>
       </p:sp>
     </p:spTree>
     <p:extLst>
       <p:ext uri="{BB962C8B-B14F-4D97-AF65-F5344CB8AC3E}">
-        <p14:creationId xmlns:p14="http://schemas.microsoft.com/office/powerpoint/2010/main" val="689357282"/>
+        <p14:creationId xmlns:p14="http://schemas.microsoft.com/office/powerpoint/2010/main" val="1585716467"/>
       </p:ext>
     </p:extLst>
   </p:cSld>
@@ -6606,137 +7960,352 @@
         </p:nvSpPr>
         <p:spPr/>
         <p:txBody>
-          <a:bodyPr/>
-          <a:lstStyle/>
-          <a:p>
-            <a:r>
-              <a:rPr lang="es-ES" dirty="0" smtClean="0"/>
-              <a:t>Librerías</a:t>
-            </a:r>
-            <a:endParaRPr lang="es-ES" dirty="0"/>
-          </a:p>
-        </p:txBody>
-      </p:sp>
-      <p:sp>
-        <p:nvSpPr>
-          <p:cNvPr id="4" name="Marcador de contenido 3"/>
-          <p:cNvSpPr>
-            <a:spLocks noGrp="1"/>
-          </p:cNvSpPr>
-          <p:nvPr>
-            <p:ph idx="1"/>
-          </p:nvPr>
-        </p:nvSpPr>
-        <p:spPr/>
-        <p:txBody>
           <a:bodyPr>
-            <a:normAutofit fontScale="92500" lnSpcReduction="10000"/>
+            <a:normAutofit/>
           </a:bodyPr>
           <a:lstStyle/>
           <a:p>
             <a:r>
               <a:rPr lang="es-ES" dirty="0" smtClean="0"/>
-              <a:t>Las librerías son fragmentos de código reusables y documentados que permiten reusar el trabajo de otros programadores.</a:t>
-            </a:r>
-          </a:p>
-          <a:p>
-            <a:r>
-              <a:rPr lang="es-ES" dirty="0" smtClean="0"/>
-              <a:t>Hoy en día nadie se plantea empezar a programar algo sin investigar antes qué librerías podrían serle de utilidad.</a:t>
-            </a:r>
-          </a:p>
-          <a:p>
-            <a:r>
-              <a:rPr lang="es-ES" dirty="0" smtClean="0"/>
-              <a:t>Processing es una librería en si misma. </a:t>
-            </a:r>
-          </a:p>
-          <a:p>
-            <a:r>
-              <a:rPr lang="es-ES" dirty="0" smtClean="0"/>
-              <a:t>Dentro de una librería se pueden usar librerías adicionales. </a:t>
-            </a:r>
-          </a:p>
-          <a:p>
-            <a:r>
-              <a:rPr lang="es-ES" dirty="0" smtClean="0"/>
-              <a:t>El IDE de Processing permite instalar librerías y usarlas. </a:t>
-            </a:r>
-          </a:p>
-          <a:p>
-            <a:r>
-              <a:rPr lang="es-ES" dirty="0" smtClean="0"/>
-              <a:t>En Processing hay librerías incluidas en el software y otras que se han de instalar previamente (</a:t>
-            </a:r>
-            <a:r>
-              <a:rPr lang="es-ES" dirty="0" err="1" smtClean="0"/>
-              <a:t>Contributed</a:t>
-            </a:r>
-            <a:r>
-              <a:rPr lang="es-ES" dirty="0" smtClean="0"/>
+              <a:t>Ejemplo para empezar:</a:t>
+            </a:r>
+            <a:r>
+              <a:rPr lang="es-ES" dirty="0"/>
+              <a:t/>
+            </a:r>
+            <a:br>
+              <a:rPr lang="es-ES" dirty="0"/>
+            </a:br>
+            <a:r>
+              <a:rPr lang="es-ES" sz="1600" cap="none" dirty="0" smtClean="0"/>
+              <a:t>https://github.com/avidabits/electroartistas/tree/master/tallerprocessing</a:t>
+            </a:r>
+            <a:endParaRPr lang="es-ES" sz="1600" cap="none" dirty="0"/>
+          </a:p>
+        </p:txBody>
+      </p:sp>
+      <p:sp>
+        <p:nvSpPr>
+          <p:cNvPr id="5" name="Marcador de contenido 3"/>
+          <p:cNvSpPr>
+            <a:spLocks noGrp="1"/>
+          </p:cNvSpPr>
+          <p:nvPr>
+            <p:ph idx="1"/>
+          </p:nvPr>
+        </p:nvSpPr>
+        <p:spPr>
+          <a:xfrm>
+            <a:off x="465084" y="2063578"/>
+            <a:ext cx="8221968" cy="4436076"/>
+          </a:xfrm>
+        </p:spPr>
+        <p:txBody>
+          <a:bodyPr anchor="t">
+            <a:normAutofit fontScale="32500" lnSpcReduction="20000"/>
+          </a:bodyPr>
+          <a:lstStyle/>
+          <a:p>
+            <a:r>
+              <a:rPr lang="es-ES" dirty="0" err="1"/>
+              <a:t>void</a:t>
+            </a:r>
+            <a:r>
+              <a:rPr lang="es-ES" dirty="0"/>
               <a:t> </a:t>
             </a:r>
             <a:r>
-              <a:rPr lang="es-ES" dirty="0" err="1" smtClean="0"/>
-              <a:t>Libraries</a:t>
-            </a:r>
-            <a:r>
-              <a:rPr lang="es-ES" dirty="0" smtClean="0"/>
-              <a:t>). </a:t>
-            </a:r>
-          </a:p>
-          <a:p>
-            <a:r>
-              <a:rPr lang="es-ES" dirty="0" smtClean="0"/>
-              <a:t>Para usar una librería se usa la palabra reservada </a:t>
-            </a:r>
-            <a:r>
-              <a:rPr lang="es-ES" dirty="0" err="1" smtClean="0"/>
-              <a:t>import</a:t>
-            </a:r>
-            <a:r>
-              <a:rPr lang="es-ES" dirty="0" smtClean="0"/>
-              <a:t>:  </a:t>
-            </a:r>
-          </a:p>
-          <a:p>
-            <a:pPr marL="0" indent="0" algn="ctr">
-              <a:buNone/>
-            </a:pPr>
-            <a:r>
-              <a:rPr lang="es-ES" dirty="0" smtClean="0"/>
-              <a:t>Ejemplo:  </a:t>
-            </a:r>
-            <a:r>
-              <a:rPr lang="es-ES" dirty="0" err="1" smtClean="0"/>
-              <a:t>import</a:t>
-            </a:r>
-            <a:r>
-              <a:rPr lang="es-ES" dirty="0" smtClean="0"/>
+              <a:rPr lang="es-ES" dirty="0" err="1"/>
+              <a:t>setup</a:t>
+            </a:r>
+            <a:r>
+              <a:rPr lang="es-ES" dirty="0"/>
+              <a:t>()</a:t>
+            </a:r>
+          </a:p>
+          <a:p>
+            <a:r>
+              <a:rPr lang="es-ES" sz="2500" dirty="0"/>
+              <a:t>{</a:t>
+            </a:r>
+          </a:p>
+          <a:p>
+            <a:r>
+              <a:rPr lang="es-ES" sz="2500" dirty="0"/>
+              <a:t> // Indicamos cual va a ser el tamaño de nuestro lienzo de dibujo</a:t>
+            </a:r>
+          </a:p>
+          <a:p>
+            <a:r>
+              <a:rPr lang="es-ES" sz="2500" dirty="0"/>
+              <a:t>   </a:t>
+            </a:r>
+            <a:r>
+              <a:rPr lang="es-ES" sz="2500" dirty="0" err="1"/>
+              <a:t>size</a:t>
+            </a:r>
+            <a:r>
+              <a:rPr lang="es-ES" sz="2500" dirty="0"/>
+              <a:t>(640, 360);</a:t>
+            </a:r>
+          </a:p>
+          <a:p>
+            <a:r>
+              <a:rPr lang="es-ES" sz="2500" dirty="0"/>
+              <a:t> // definimos el color de fondo</a:t>
+            </a:r>
+          </a:p>
+          <a:p>
+            <a:r>
+              <a:rPr lang="es-ES" sz="2500" dirty="0"/>
+              <a:t>   </a:t>
+            </a:r>
+            <a:r>
+              <a:rPr lang="es-ES" sz="2500" dirty="0" err="1"/>
+              <a:t>background</a:t>
+            </a:r>
+            <a:r>
+              <a:rPr lang="es-ES" sz="2500" dirty="0"/>
+              <a:t> (220, 220, 128); </a:t>
+            </a:r>
+          </a:p>
+          <a:p>
+            <a:r>
+              <a:rPr lang="es-ES" sz="2500" dirty="0"/>
+              <a:t> // definimos cada cuantos segundo se redibuja </a:t>
+            </a:r>
+            <a:r>
+              <a:rPr lang="es-ES" sz="2500" dirty="0" err="1"/>
+              <a:t>nuesto</a:t>
+            </a:r>
+            <a:r>
+              <a:rPr lang="es-ES" sz="2500" dirty="0"/>
+              <a:t> lienzo</a:t>
+            </a:r>
+          </a:p>
+          <a:p>
+            <a:r>
+              <a:rPr lang="es-ES" sz="2500" dirty="0"/>
               <a:t> </a:t>
             </a:r>
             <a:r>
-              <a:rPr lang="es-ES" dirty="0" err="1"/>
-              <a:t>processing.serial</a:t>
-            </a:r>
-            <a:r>
-              <a:rPr lang="es-ES" dirty="0"/>
-              <a:t>.*;</a:t>
-            </a:r>
-            <a:endParaRPr lang="es-ES" dirty="0" smtClean="0"/>
-          </a:p>
-          <a:p>
-            <a:pPr marL="0" indent="0">
-              <a:buNone/>
-            </a:pPr>
-            <a:endParaRPr lang="es-ES" dirty="0"/>
-          </a:p>
-        </p:txBody>
-      </p:sp>
+              <a:rPr lang="es-ES" sz="2500" dirty="0" err="1"/>
+              <a:t>frameRate</a:t>
+            </a:r>
+            <a:r>
+              <a:rPr lang="es-ES" sz="2500" dirty="0"/>
+              <a:t>(24);</a:t>
+            </a:r>
+          </a:p>
+          <a:p>
+            <a:r>
+              <a:rPr lang="es-ES" sz="2500" dirty="0" smtClean="0"/>
+              <a:t>}</a:t>
+            </a:r>
+            <a:endParaRPr lang="es-ES" sz="2500" dirty="0"/>
+          </a:p>
+          <a:p>
+            <a:endParaRPr lang="es-ES" sz="2500" dirty="0"/>
+          </a:p>
+          <a:p>
+            <a:r>
+              <a:rPr lang="es-ES" sz="2500" dirty="0"/>
+              <a:t>// en la función </a:t>
+            </a:r>
+            <a:r>
+              <a:rPr lang="es-ES" sz="2500" dirty="0" err="1"/>
+              <a:t>draw</a:t>
+            </a:r>
+            <a:r>
+              <a:rPr lang="es-ES" sz="2500" dirty="0"/>
+              <a:t> realizamos nuestros dibujos. </a:t>
+            </a:r>
+          </a:p>
+          <a:p>
+            <a:r>
+              <a:rPr lang="es-ES" sz="2500" dirty="0" err="1" smtClean="0"/>
+              <a:t>void</a:t>
+            </a:r>
+            <a:r>
+              <a:rPr lang="es-ES" sz="2500" dirty="0" smtClean="0"/>
+              <a:t> </a:t>
+            </a:r>
+            <a:r>
+              <a:rPr lang="es-ES" sz="2500" dirty="0" err="1"/>
+              <a:t>draw</a:t>
+            </a:r>
+            <a:r>
+              <a:rPr lang="es-ES" sz="2500" dirty="0"/>
+              <a:t>()</a:t>
+            </a:r>
+          </a:p>
+          <a:p>
+            <a:r>
+              <a:rPr lang="es-ES" sz="2500" dirty="0"/>
+              <a:t>{</a:t>
+            </a:r>
+          </a:p>
+          <a:p>
+            <a:r>
+              <a:rPr lang="es-ES" sz="2500" dirty="0"/>
+              <a:t>    </a:t>
+            </a:r>
+            <a:r>
+              <a:rPr lang="es-ES" sz="2500" dirty="0" err="1"/>
+              <a:t>background</a:t>
+            </a:r>
+            <a:r>
+              <a:rPr lang="es-ES" sz="2500" dirty="0"/>
+              <a:t>(220, 220, 128);</a:t>
+            </a:r>
+          </a:p>
+          <a:p>
+            <a:r>
+              <a:rPr lang="es-ES" sz="2500" dirty="0"/>
+              <a:t>    </a:t>
+            </a:r>
+          </a:p>
+          <a:p>
+            <a:r>
+              <a:rPr lang="es-ES" sz="2500" dirty="0"/>
+              <a:t>     </a:t>
+            </a:r>
+            <a:r>
+              <a:rPr lang="es-ES" sz="2500" dirty="0" err="1"/>
+              <a:t>stroke</a:t>
+            </a:r>
+            <a:r>
+              <a:rPr lang="es-ES" sz="2500" dirty="0"/>
+              <a:t>(35, 35, 127);</a:t>
+            </a:r>
+          </a:p>
+          <a:p>
+            <a:r>
+              <a:rPr lang="es-ES" sz="2500" dirty="0"/>
+              <a:t>    // </a:t>
+            </a:r>
+            <a:r>
+              <a:rPr lang="es-ES" sz="2500" dirty="0" err="1"/>
+              <a:t>processing</a:t>
+            </a:r>
+            <a:r>
+              <a:rPr lang="es-ES" sz="2500" dirty="0"/>
+              <a:t> nos proporciona variables predefinidas para evitarnos cálculos     </a:t>
+            </a:r>
+          </a:p>
+          <a:p>
+            <a:r>
+              <a:rPr lang="es-ES" sz="2500" dirty="0"/>
+              <a:t>    line(</a:t>
+            </a:r>
+            <a:r>
+              <a:rPr lang="es-ES" sz="2500" dirty="0" err="1"/>
+              <a:t>mouseX</a:t>
+            </a:r>
+            <a:r>
+              <a:rPr lang="es-ES" sz="2500" dirty="0"/>
+              <a:t>, 0, </a:t>
+            </a:r>
+            <a:r>
+              <a:rPr lang="es-ES" sz="2500" dirty="0" err="1"/>
+              <a:t>mouseX</a:t>
+            </a:r>
+            <a:r>
+              <a:rPr lang="es-ES" sz="2500" dirty="0"/>
+              <a:t>, </a:t>
+            </a:r>
+            <a:r>
+              <a:rPr lang="es-ES" sz="2500" dirty="0" err="1"/>
+              <a:t>height</a:t>
+            </a:r>
+            <a:r>
+              <a:rPr lang="es-ES" sz="2500" dirty="0"/>
+              <a:t>); </a:t>
+            </a:r>
+          </a:p>
+          <a:p>
+            <a:r>
+              <a:rPr lang="es-ES" sz="2500" dirty="0"/>
+              <a:t>    </a:t>
+            </a:r>
+            <a:r>
+              <a:rPr lang="es-ES" sz="2500" dirty="0" err="1"/>
+              <a:t>ellipse</a:t>
+            </a:r>
+            <a:r>
+              <a:rPr lang="es-ES" sz="2500" dirty="0"/>
+              <a:t>(</a:t>
+            </a:r>
+            <a:r>
+              <a:rPr lang="es-ES" sz="2500" dirty="0" err="1"/>
+              <a:t>mouseX</a:t>
+            </a:r>
+            <a:r>
+              <a:rPr lang="es-ES" sz="2500" dirty="0"/>
+              <a:t>, </a:t>
+            </a:r>
+            <a:r>
+              <a:rPr lang="es-ES" sz="2500" dirty="0" err="1"/>
+              <a:t>mouseY</a:t>
+            </a:r>
+            <a:r>
+              <a:rPr lang="es-ES" sz="2500" dirty="0"/>
+              <a:t>, </a:t>
+            </a:r>
+            <a:r>
+              <a:rPr lang="es-ES" sz="2500" dirty="0" err="1"/>
+              <a:t>width</a:t>
+            </a:r>
+            <a:r>
+              <a:rPr lang="es-ES" sz="2500" dirty="0"/>
+              <a:t>/4, </a:t>
+            </a:r>
+            <a:r>
+              <a:rPr lang="es-ES" sz="2500" dirty="0" err="1"/>
+              <a:t>height</a:t>
+            </a:r>
+            <a:r>
+              <a:rPr lang="es-ES" sz="2500" dirty="0"/>
+              <a:t>/4);</a:t>
+            </a:r>
+          </a:p>
+          <a:p>
+            <a:r>
+              <a:rPr lang="es-ES" sz="2500" dirty="0"/>
+              <a:t>}</a:t>
+            </a:r>
+            <a:endParaRPr lang="es-ES" sz="2500" dirty="0"/>
+          </a:p>
+        </p:txBody>
+      </p:sp>
+      <p:pic>
+        <p:nvPicPr>
+          <p:cNvPr id="3" name="Imagen 2"/>
+          <p:cNvPicPr>
+            <a:picLocks noChangeAspect="1"/>
+          </p:cNvPicPr>
+          <p:nvPr/>
+        </p:nvPicPr>
+        <p:blipFill>
+          <a:blip r:embed="rId2"/>
+          <a:stretch>
+            <a:fillRect/>
+          </a:stretch>
+        </p:blipFill>
+        <p:spPr>
+          <a:xfrm>
+            <a:off x="4372742" y="2063578"/>
+            <a:ext cx="4314310" cy="2711107"/>
+          </a:xfrm>
+          <a:prstGeom prst="rect">
+            <a:avLst/>
+          </a:prstGeom>
+        </p:spPr>
+      </p:pic>
     </p:spTree>
     <p:extLst>
       <p:ext uri="{BB962C8B-B14F-4D97-AF65-F5344CB8AC3E}">
-        <p14:creationId xmlns:p14="http://schemas.microsoft.com/office/powerpoint/2010/main" val="3737990546"/>
+        <p14:creationId xmlns:p14="http://schemas.microsoft.com/office/powerpoint/2010/main" val="860160593"/>
       </p:ext>
     </p:extLst>
   </p:cSld>

</xml_diff>